<commit_message>
Updated diagrams (for CP-1 & CP-2)
</commit_message>
<xml_diff>
--- a/Report & Diagrams/Presentation1.pptx
+++ b/Report & Diagrams/Presentation1.pptx
@@ -7,6 +7,7 @@
   <p:sldIdLst>
     <p:sldId id="256" r:id="rId2"/>
     <p:sldId id="257" r:id="rId3"/>
+    <p:sldId id="258" r:id="rId4"/>
   </p:sldIdLst>
   <p:sldSz cx="6858000" cy="9906000" type="A4"/>
   <p:notesSz cx="6858000" cy="9144000"/>
@@ -244,7 +245,7 @@
           <a:p>
             <a:fld id="{F6D0DC95-96D7-4443-A9FE-D9D3645C5F4E}" type="datetimeFigureOut">
               <a:rPr lang="en-SG" smtClean="0"/>
-              <a:t>11/4/2019</a:t>
+              <a:t>12/4/2019</a:t>
             </a:fld>
             <a:endParaRPr lang="en-SG"/>
           </a:p>
@@ -414,7 +415,7 @@
           <a:p>
             <a:fld id="{F6D0DC95-96D7-4443-A9FE-D9D3645C5F4E}" type="datetimeFigureOut">
               <a:rPr lang="en-SG" smtClean="0"/>
-              <a:t>11/4/2019</a:t>
+              <a:t>12/4/2019</a:t>
             </a:fld>
             <a:endParaRPr lang="en-SG"/>
           </a:p>
@@ -594,7 +595,7 @@
           <a:p>
             <a:fld id="{F6D0DC95-96D7-4443-A9FE-D9D3645C5F4E}" type="datetimeFigureOut">
               <a:rPr lang="en-SG" smtClean="0"/>
-              <a:t>11/4/2019</a:t>
+              <a:t>12/4/2019</a:t>
             </a:fld>
             <a:endParaRPr lang="en-SG"/>
           </a:p>
@@ -764,7 +765,7 @@
           <a:p>
             <a:fld id="{F6D0DC95-96D7-4443-A9FE-D9D3645C5F4E}" type="datetimeFigureOut">
               <a:rPr lang="en-SG" smtClean="0"/>
-              <a:t>11/4/2019</a:t>
+              <a:t>12/4/2019</a:t>
             </a:fld>
             <a:endParaRPr lang="en-SG"/>
           </a:p>
@@ -1008,7 +1009,7 @@
           <a:p>
             <a:fld id="{F6D0DC95-96D7-4443-A9FE-D9D3645C5F4E}" type="datetimeFigureOut">
               <a:rPr lang="en-SG" smtClean="0"/>
-              <a:t>11/4/2019</a:t>
+              <a:t>12/4/2019</a:t>
             </a:fld>
             <a:endParaRPr lang="en-SG"/>
           </a:p>
@@ -1240,7 +1241,7 @@
           <a:p>
             <a:fld id="{F6D0DC95-96D7-4443-A9FE-D9D3645C5F4E}" type="datetimeFigureOut">
               <a:rPr lang="en-SG" smtClean="0"/>
-              <a:t>11/4/2019</a:t>
+              <a:t>12/4/2019</a:t>
             </a:fld>
             <a:endParaRPr lang="en-SG"/>
           </a:p>
@@ -1607,7 +1608,7 @@
           <a:p>
             <a:fld id="{F6D0DC95-96D7-4443-A9FE-D9D3645C5F4E}" type="datetimeFigureOut">
               <a:rPr lang="en-SG" smtClean="0"/>
-              <a:t>11/4/2019</a:t>
+              <a:t>12/4/2019</a:t>
             </a:fld>
             <a:endParaRPr lang="en-SG"/>
           </a:p>
@@ -1725,7 +1726,7 @@
           <a:p>
             <a:fld id="{F6D0DC95-96D7-4443-A9FE-D9D3645C5F4E}" type="datetimeFigureOut">
               <a:rPr lang="en-SG" smtClean="0"/>
-              <a:t>11/4/2019</a:t>
+              <a:t>12/4/2019</a:t>
             </a:fld>
             <a:endParaRPr lang="en-SG"/>
           </a:p>
@@ -1820,7 +1821,7 @@
           <a:p>
             <a:fld id="{F6D0DC95-96D7-4443-A9FE-D9D3645C5F4E}" type="datetimeFigureOut">
               <a:rPr lang="en-SG" smtClean="0"/>
-              <a:t>11/4/2019</a:t>
+              <a:t>12/4/2019</a:t>
             </a:fld>
             <a:endParaRPr lang="en-SG"/>
           </a:p>
@@ -2097,7 +2098,7 @@
           <a:p>
             <a:fld id="{F6D0DC95-96D7-4443-A9FE-D9D3645C5F4E}" type="datetimeFigureOut">
               <a:rPr lang="en-SG" smtClean="0"/>
-              <a:t>11/4/2019</a:t>
+              <a:t>12/4/2019</a:t>
             </a:fld>
             <a:endParaRPr lang="en-SG"/>
           </a:p>
@@ -2354,7 +2355,7 @@
           <a:p>
             <a:fld id="{F6D0DC95-96D7-4443-A9FE-D9D3645C5F4E}" type="datetimeFigureOut">
               <a:rPr lang="en-SG" smtClean="0"/>
-              <a:t>11/4/2019</a:t>
+              <a:t>12/4/2019</a:t>
             </a:fld>
             <a:endParaRPr lang="en-SG"/>
           </a:p>
@@ -2567,7 +2568,7 @@
           <a:p>
             <a:fld id="{F6D0DC95-96D7-4443-A9FE-D9D3645C5F4E}" type="datetimeFigureOut">
               <a:rPr lang="en-SG" smtClean="0"/>
-              <a:t>11/4/2019</a:t>
+              <a:t>12/4/2019</a:t>
             </a:fld>
             <a:endParaRPr lang="en-SG"/>
           </a:p>
@@ -6196,8 +6197,8 @@
           </a:fontRef>
         </p:style>
       </p:cxnSp>
-      <mc:AlternateContent xmlns:mc="http://schemas.openxmlformats.org/markup-compatibility/2006">
-        <mc:Choice xmlns:a14="http://schemas.microsoft.com/office/drawing/2010/main" Requires="a14">
+      <mc:AlternateContent xmlns:mc="http://schemas.openxmlformats.org/markup-compatibility/2006" xmlns:a14="http://schemas.microsoft.com/office/drawing/2010/main">
+        <mc:Choice Requires="a14">
           <p:sp>
             <p:nvSpPr>
               <p:cNvPr id="39" name="TextBox 38">
@@ -6285,7 +6286,7 @@
             </p:txBody>
           </p:sp>
         </mc:Choice>
-        <mc:Fallback>
+        <mc:Fallback xmlns="">
           <p:sp>
             <p:nvSpPr>
               <p:cNvPr id="39" name="TextBox 38">
@@ -7124,10 +7125,3402 @@
           </a:p>
         </p:txBody>
       </p:sp>
+      <mc:AlternateContent xmlns:mc="http://schemas.openxmlformats.org/markup-compatibility/2006">
+        <mc:Choice xmlns:a14="http://schemas.microsoft.com/office/drawing/2010/main" Requires="a14">
+          <p:sp>
+            <p:nvSpPr>
+              <p:cNvPr id="49" name="TextBox 48">
+                <a:extLst>
+                  <a:ext uri="{FF2B5EF4-FFF2-40B4-BE49-F238E27FC236}">
+                    <a16:creationId xmlns:a16="http://schemas.microsoft.com/office/drawing/2014/main" id="{D915BE9D-27E2-4C9D-9E4F-29260590B169}"/>
+                  </a:ext>
+                </a:extLst>
+              </p:cNvPr>
+              <p:cNvSpPr txBox="1"/>
+              <p:nvPr/>
+            </p:nvSpPr>
+            <p:spPr>
+              <a:xfrm>
+                <a:off x="-462605" y="7059846"/>
+                <a:ext cx="1809096" cy="523220"/>
+              </a:xfrm>
+              <a:prstGeom prst="rect">
+                <a:avLst/>
+              </a:prstGeom>
+              <a:noFill/>
+              <a:ln>
+                <a:solidFill>
+                  <a:schemeClr val="tx1"/>
+                </a:solidFill>
+              </a:ln>
+            </p:spPr>
+            <p:txBody>
+              <a:bodyPr wrap="square" rtlCol="0">
+                <a:spAutoFit/>
+              </a:bodyPr>
+              <a:lstStyle/>
+              <a:p>
+                <a:r>
+                  <a:rPr lang="en-SG" sz="1400" dirty="0">
+                    <a:latin typeface="Times New Roman" panose="02020603050405020304" pitchFamily="18" charset="0"/>
+                    <a:cs typeface="Times New Roman" panose="02020603050405020304" pitchFamily="18" charset="0"/>
+                  </a:rPr>
+                  <a:t>- Encrypt file block  (</a:t>
+                </a:r>
+                <a14:m>
+                  <m:oMath xmlns:m="http://schemas.openxmlformats.org/officeDocument/2006/math">
+                    <m:sSubSup>
+                      <m:sSubSupPr>
+                        <m:ctrlPr>
+                          <a:rPr lang="en-SG" sz="1400" b="1" i="1">
+                            <a:latin typeface="Cambria Math" panose="02040503050406030204" pitchFamily="18" charset="0"/>
+                            <a:cs typeface="Times New Roman" panose="02020603050405020304" pitchFamily="18" charset="0"/>
+                          </a:rPr>
+                        </m:ctrlPr>
+                      </m:sSubSupPr>
+                      <m:e>
+                        <m:r>
+                          <a:rPr lang="en-SG" sz="1400" b="1" i="1">
+                            <a:latin typeface="Cambria Math" panose="02040503050406030204" pitchFamily="18" charset="0"/>
+                            <a:cs typeface="Times New Roman" panose="02020603050405020304" pitchFamily="18" charset="0"/>
+                          </a:rPr>
+                          <m:t>𝑲</m:t>
+                        </m:r>
+                      </m:e>
+                      <m:sub>
+                        <m:r>
+                          <a:rPr lang="en-SG" sz="1400" b="1" i="1">
+                            <a:latin typeface="Cambria Math" panose="02040503050406030204" pitchFamily="18" charset="0"/>
+                            <a:cs typeface="Times New Roman" panose="02020603050405020304" pitchFamily="18" charset="0"/>
+                          </a:rPr>
+                          <m:t>𝑺</m:t>
+                        </m:r>
+                      </m:sub>
+                      <m:sup>
+                        <m:r>
+                          <a:rPr lang="en-SG" sz="1400" b="1" i="1" smtClean="0">
+                            <a:latin typeface="Cambria Math" panose="02040503050406030204" pitchFamily="18" charset="0"/>
+                            <a:cs typeface="Times New Roman" panose="02020603050405020304" pitchFamily="18" charset="0"/>
+                          </a:rPr>
+                          <m:t>+</m:t>
+                        </m:r>
+                      </m:sup>
+                    </m:sSubSup>
+                  </m:oMath>
+                </a14:m>
+                <a:r>
+                  <a:rPr lang="en-SG" sz="1400" dirty="0">
+                    <a:latin typeface="Times New Roman" panose="02020603050405020304" pitchFamily="18" charset="0"/>
+                    <a:cs typeface="Times New Roman" panose="02020603050405020304" pitchFamily="18" charset="0"/>
+                  </a:rPr>
+                  <a:t>(file block))</a:t>
+                </a:r>
+              </a:p>
+            </p:txBody>
+          </p:sp>
+        </mc:Choice>
+        <mc:Fallback>
+          <p:sp>
+            <p:nvSpPr>
+              <p:cNvPr id="49" name="TextBox 48">
+                <a:extLst>
+                  <a:ext uri="{FF2B5EF4-FFF2-40B4-BE49-F238E27FC236}">
+                    <a16:creationId xmlns:a16="http://schemas.microsoft.com/office/drawing/2014/main" id="{D915BE9D-27E2-4C9D-9E4F-29260590B169}"/>
+                  </a:ext>
+                </a:extLst>
+              </p:cNvPr>
+              <p:cNvSpPr txBox="1">
+                <a:spLocks noRot="1" noChangeAspect="1" noMove="1" noResize="1" noEditPoints="1" noAdjustHandles="1" noChangeArrowheads="1" noChangeShapeType="1" noTextEdit="1"/>
+              </p:cNvSpPr>
+              <p:nvPr/>
+            </p:nvSpPr>
+            <p:spPr>
+              <a:xfrm>
+                <a:off x="-462605" y="7059846"/>
+                <a:ext cx="1809096" cy="523220"/>
+              </a:xfrm>
+              <a:prstGeom prst="rect">
+                <a:avLst/>
+              </a:prstGeom>
+              <a:blipFill>
+                <a:blip r:embed="rId13"/>
+                <a:stretch>
+                  <a:fillRect l="-669" t="-1136" b="-10227"/>
+                </a:stretch>
+              </a:blipFill>
+              <a:ln>
+                <a:solidFill>
+                  <a:schemeClr val="tx1"/>
+                </a:solidFill>
+              </a:ln>
+            </p:spPr>
+            <p:txBody>
+              <a:bodyPr/>
+              <a:lstStyle/>
+              <a:p>
+                <a:r>
+                  <a:rPr lang="en-SG">
+                    <a:noFill/>
+                  </a:rPr>
+                  <a:t> </a:t>
+                </a:r>
+              </a:p>
+            </p:txBody>
+          </p:sp>
+        </mc:Fallback>
+      </mc:AlternateContent>
+      <mc:AlternateContent xmlns:mc="http://schemas.openxmlformats.org/markup-compatibility/2006">
+        <mc:Choice xmlns:a14="http://schemas.microsoft.com/office/drawing/2010/main" Requires="a14">
+          <p:sp>
+            <p:nvSpPr>
+              <p:cNvPr id="51" name="TextBox 50">
+                <a:extLst>
+                  <a:ext uri="{FF2B5EF4-FFF2-40B4-BE49-F238E27FC236}">
+                    <a16:creationId xmlns:a16="http://schemas.microsoft.com/office/drawing/2014/main" id="{9CD58027-58DD-475D-8E9E-89027FF238ED}"/>
+                  </a:ext>
+                </a:extLst>
+              </p:cNvPr>
+              <p:cNvSpPr txBox="1"/>
+              <p:nvPr/>
+            </p:nvSpPr>
+            <p:spPr>
+              <a:xfrm>
+                <a:off x="-470210" y="6369138"/>
+                <a:ext cx="1809097" cy="523220"/>
+              </a:xfrm>
+              <a:prstGeom prst="rect">
+                <a:avLst/>
+              </a:prstGeom>
+              <a:noFill/>
+              <a:ln>
+                <a:solidFill>
+                  <a:schemeClr val="tx1"/>
+                </a:solidFill>
+              </a:ln>
+            </p:spPr>
+            <p:txBody>
+              <a:bodyPr wrap="square" rtlCol="0">
+                <a:spAutoFit/>
+              </a:bodyPr>
+              <a:lstStyle/>
+              <a:p>
+                <a:r>
+                  <a:rPr lang="en-SG" sz="1400" dirty="0">
+                    <a:latin typeface="Times New Roman" panose="02020603050405020304" pitchFamily="18" charset="0"/>
+                    <a:cs typeface="Times New Roman" panose="02020603050405020304" pitchFamily="18" charset="0"/>
+                  </a:rPr>
+                  <a:t>- Encrypt file name  (</a:t>
+                </a:r>
+                <a14:m>
+                  <m:oMath xmlns:m="http://schemas.openxmlformats.org/officeDocument/2006/math">
+                    <m:sSubSup>
+                      <m:sSubSupPr>
+                        <m:ctrlPr>
+                          <a:rPr lang="en-SG" sz="1400" b="1" i="1">
+                            <a:latin typeface="Cambria Math" panose="02040503050406030204" pitchFamily="18" charset="0"/>
+                            <a:cs typeface="Times New Roman" panose="02020603050405020304" pitchFamily="18" charset="0"/>
+                          </a:rPr>
+                        </m:ctrlPr>
+                      </m:sSubSupPr>
+                      <m:e>
+                        <m:r>
+                          <a:rPr lang="en-SG" sz="1400" b="1" i="1">
+                            <a:latin typeface="Cambria Math" panose="02040503050406030204" pitchFamily="18" charset="0"/>
+                            <a:cs typeface="Times New Roman" panose="02020603050405020304" pitchFamily="18" charset="0"/>
+                          </a:rPr>
+                          <m:t>𝑲</m:t>
+                        </m:r>
+                      </m:e>
+                      <m:sub>
+                        <m:r>
+                          <a:rPr lang="en-SG" sz="1400" b="1" i="1">
+                            <a:latin typeface="Cambria Math" panose="02040503050406030204" pitchFamily="18" charset="0"/>
+                            <a:cs typeface="Times New Roman" panose="02020603050405020304" pitchFamily="18" charset="0"/>
+                          </a:rPr>
+                          <m:t>𝑺</m:t>
+                        </m:r>
+                      </m:sub>
+                      <m:sup>
+                        <m:r>
+                          <a:rPr lang="en-SG" sz="1400" b="1" i="1" smtClean="0">
+                            <a:latin typeface="Cambria Math" panose="02040503050406030204" pitchFamily="18" charset="0"/>
+                            <a:cs typeface="Times New Roman" panose="02020603050405020304" pitchFamily="18" charset="0"/>
+                          </a:rPr>
+                          <m:t>+</m:t>
+                        </m:r>
+                      </m:sup>
+                    </m:sSubSup>
+                  </m:oMath>
+                </a14:m>
+                <a:r>
+                  <a:rPr lang="en-SG" sz="1400" dirty="0">
+                    <a:latin typeface="Times New Roman" panose="02020603050405020304" pitchFamily="18" charset="0"/>
+                    <a:cs typeface="Times New Roman" panose="02020603050405020304" pitchFamily="18" charset="0"/>
+                  </a:rPr>
+                  <a:t>(file name))</a:t>
+                </a:r>
+              </a:p>
+            </p:txBody>
+          </p:sp>
+        </mc:Choice>
+        <mc:Fallback>
+          <p:sp>
+            <p:nvSpPr>
+              <p:cNvPr id="51" name="TextBox 50">
+                <a:extLst>
+                  <a:ext uri="{FF2B5EF4-FFF2-40B4-BE49-F238E27FC236}">
+                    <a16:creationId xmlns:a16="http://schemas.microsoft.com/office/drawing/2014/main" id="{9CD58027-58DD-475D-8E9E-89027FF238ED}"/>
+                  </a:ext>
+                </a:extLst>
+              </p:cNvPr>
+              <p:cNvSpPr txBox="1">
+                <a:spLocks noRot="1" noChangeAspect="1" noMove="1" noResize="1" noEditPoints="1" noAdjustHandles="1" noChangeArrowheads="1" noChangeShapeType="1" noTextEdit="1"/>
+              </p:cNvSpPr>
+              <p:nvPr/>
+            </p:nvSpPr>
+            <p:spPr>
+              <a:xfrm>
+                <a:off x="-470210" y="6369138"/>
+                <a:ext cx="1809097" cy="523220"/>
+              </a:xfrm>
+              <a:prstGeom prst="rect">
+                <a:avLst/>
+              </a:prstGeom>
+              <a:blipFill>
+                <a:blip r:embed="rId14"/>
+                <a:stretch>
+                  <a:fillRect l="-669" t="-1136" b="-9091"/>
+                </a:stretch>
+              </a:blipFill>
+              <a:ln>
+                <a:solidFill>
+                  <a:schemeClr val="tx1"/>
+                </a:solidFill>
+              </a:ln>
+            </p:spPr>
+            <p:txBody>
+              <a:bodyPr/>
+              <a:lstStyle/>
+              <a:p>
+                <a:r>
+                  <a:rPr lang="en-SG">
+                    <a:noFill/>
+                  </a:rPr>
+                  <a:t> </a:t>
+                </a:r>
+              </a:p>
+            </p:txBody>
+          </p:sp>
+        </mc:Fallback>
+      </mc:AlternateContent>
     </p:spTree>
     <p:extLst>
       <p:ext uri="{BB962C8B-B14F-4D97-AF65-F5344CB8AC3E}">
         <p14:creationId xmlns:p14="http://schemas.microsoft.com/office/powerpoint/2010/main" val="3006393963"/>
+      </p:ext>
+    </p:extLst>
+  </p:cSld>
+  <p:clrMapOvr>
+    <a:masterClrMapping/>
+  </p:clrMapOvr>
+</p:sld>
+</file>
+
+<file path=ppt/slides/slide3.xml><?xml version="1.0" encoding="utf-8"?>
+<p:sld xmlns:a="http://schemas.openxmlformats.org/drawingml/2006/main" xmlns:r="http://schemas.openxmlformats.org/officeDocument/2006/relationships" xmlns:p="http://schemas.openxmlformats.org/presentationml/2006/main">
+  <p:cSld>
+    <p:spTree>
+      <p:nvGrpSpPr>
+        <p:cNvPr id="1" name=""/>
+        <p:cNvGrpSpPr/>
+        <p:nvPr/>
+      </p:nvGrpSpPr>
+      <p:grpSpPr>
+        <a:xfrm>
+          <a:off x="0" y="0"/>
+          <a:ext cx="0" cy="0"/>
+          <a:chOff x="0" y="0"/>
+          <a:chExt cx="0" cy="0"/>
+        </a:xfrm>
+      </p:grpSpPr>
+      <p:sp>
+        <p:nvSpPr>
+          <p:cNvPr id="6" name="TextBox 5">
+            <a:extLst>
+              <a:ext uri="{FF2B5EF4-FFF2-40B4-BE49-F238E27FC236}">
+                <a16:creationId xmlns:a16="http://schemas.microsoft.com/office/drawing/2014/main" id="{1166B870-DB03-4EF3-B42E-F88EF4DD3927}"/>
+              </a:ext>
+            </a:extLst>
+          </p:cNvPr>
+          <p:cNvSpPr txBox="1"/>
+          <p:nvPr/>
+        </p:nvSpPr>
+        <p:spPr>
+          <a:xfrm>
+            <a:off x="1097809" y="890032"/>
+            <a:ext cx="787395" cy="369332"/>
+          </a:xfrm>
+          <a:prstGeom prst="rect">
+            <a:avLst/>
+          </a:prstGeom>
+          <a:noFill/>
+        </p:spPr>
+        <p:txBody>
+          <a:bodyPr wrap="none" rtlCol="0">
+            <a:spAutoFit/>
+          </a:bodyPr>
+          <a:lstStyle/>
+          <a:p>
+            <a:r>
+              <a:rPr lang="en-SG" b="1" dirty="0">
+                <a:solidFill>
+                  <a:srgbClr val="FF0000"/>
+                </a:solidFill>
+                <a:latin typeface="Times New Roman" panose="02020603050405020304" pitchFamily="18" charset="0"/>
+                <a:cs typeface="Times New Roman" panose="02020603050405020304" pitchFamily="18" charset="0"/>
+              </a:rPr>
+              <a:t>Client</a:t>
+            </a:r>
+          </a:p>
+        </p:txBody>
+      </p:sp>
+      <p:sp>
+        <p:nvSpPr>
+          <p:cNvPr id="7" name="TextBox 6">
+            <a:extLst>
+              <a:ext uri="{FF2B5EF4-FFF2-40B4-BE49-F238E27FC236}">
+                <a16:creationId xmlns:a16="http://schemas.microsoft.com/office/drawing/2014/main" id="{886978F2-B60C-4EBD-8DB3-833C0F053698}"/>
+              </a:ext>
+            </a:extLst>
+          </p:cNvPr>
+          <p:cNvSpPr txBox="1"/>
+          <p:nvPr/>
+        </p:nvSpPr>
+        <p:spPr>
+          <a:xfrm>
+            <a:off x="4687678" y="520700"/>
+            <a:ext cx="838691" cy="369332"/>
+          </a:xfrm>
+          <a:prstGeom prst="rect">
+            <a:avLst/>
+          </a:prstGeom>
+          <a:noFill/>
+        </p:spPr>
+        <p:txBody>
+          <a:bodyPr wrap="none" rtlCol="0">
+            <a:spAutoFit/>
+          </a:bodyPr>
+          <a:lstStyle/>
+          <a:p>
+            <a:r>
+              <a:rPr lang="en-SG" b="1" dirty="0">
+                <a:solidFill>
+                  <a:srgbClr val="FF0000"/>
+                </a:solidFill>
+                <a:latin typeface="Times New Roman" panose="02020603050405020304" pitchFamily="18" charset="0"/>
+                <a:cs typeface="Times New Roman" panose="02020603050405020304" pitchFamily="18" charset="0"/>
+              </a:rPr>
+              <a:t>Server</a:t>
+            </a:r>
+          </a:p>
+        </p:txBody>
+      </p:sp>
+      <mc:AlternateContent xmlns:mc="http://schemas.openxmlformats.org/markup-compatibility/2006" xmlns:a14="http://schemas.microsoft.com/office/drawing/2010/main">
+        <mc:Choice Requires="a14">
+          <p:sp>
+            <p:nvSpPr>
+              <p:cNvPr id="8" name="TextBox 7">
+                <a:extLst>
+                  <a:ext uri="{FF2B5EF4-FFF2-40B4-BE49-F238E27FC236}">
+                    <a16:creationId xmlns:a16="http://schemas.microsoft.com/office/drawing/2014/main" id="{26D4348F-66EB-4872-AC81-7E7CAE08BAB8}"/>
+                  </a:ext>
+                </a:extLst>
+              </p:cNvPr>
+              <p:cNvSpPr txBox="1"/>
+              <p:nvPr/>
+            </p:nvSpPr>
+            <p:spPr>
+              <a:xfrm>
+                <a:off x="4687678" y="832882"/>
+                <a:ext cx="2035557" cy="738664"/>
+              </a:xfrm>
+              <a:prstGeom prst="rect">
+                <a:avLst/>
+              </a:prstGeom>
+              <a:noFill/>
+            </p:spPr>
+            <p:txBody>
+              <a:bodyPr wrap="none" rtlCol="0">
+                <a:spAutoFit/>
+              </a:bodyPr>
+              <a:lstStyle/>
+              <a:p>
+                <a:r>
+                  <a:rPr lang="en-SG" sz="1400" dirty="0">
+                    <a:latin typeface="Times New Roman" panose="02020603050405020304" pitchFamily="18" charset="0"/>
+                    <a:cs typeface="Times New Roman" panose="02020603050405020304" pitchFamily="18" charset="0"/>
+                  </a:rPr>
+                  <a:t>Public Key: </a:t>
+                </a:r>
+                <a14:m>
+                  <m:oMath xmlns:m="http://schemas.openxmlformats.org/officeDocument/2006/math">
+                    <m:sSubSup>
+                      <m:sSubSupPr>
+                        <m:ctrlPr>
+                          <a:rPr lang="en-SG" sz="1400" b="1" i="1" smtClean="0">
+                            <a:latin typeface="Cambria Math" panose="02040503050406030204" pitchFamily="18" charset="0"/>
+                            <a:cs typeface="Times New Roman" panose="02020603050405020304" pitchFamily="18" charset="0"/>
+                          </a:rPr>
+                        </m:ctrlPr>
+                      </m:sSubSupPr>
+                      <m:e>
+                        <m:r>
+                          <a:rPr lang="en-SG" sz="1400" b="1" i="1" smtClean="0">
+                            <a:latin typeface="Cambria Math" panose="02040503050406030204" pitchFamily="18" charset="0"/>
+                            <a:cs typeface="Times New Roman" panose="02020603050405020304" pitchFamily="18" charset="0"/>
+                          </a:rPr>
+                          <m:t>𝑲</m:t>
+                        </m:r>
+                      </m:e>
+                      <m:sub>
+                        <m:r>
+                          <a:rPr lang="en-SG" sz="1400" b="1" i="1" smtClean="0">
+                            <a:latin typeface="Cambria Math" panose="02040503050406030204" pitchFamily="18" charset="0"/>
+                            <a:cs typeface="Times New Roman" panose="02020603050405020304" pitchFamily="18" charset="0"/>
+                          </a:rPr>
+                          <m:t>𝒔</m:t>
+                        </m:r>
+                      </m:sub>
+                      <m:sup>
+                        <m:r>
+                          <a:rPr lang="en-SG" sz="1400" b="1" i="1" smtClean="0">
+                            <a:latin typeface="Cambria Math" panose="02040503050406030204" pitchFamily="18" charset="0"/>
+                            <a:cs typeface="Times New Roman" panose="02020603050405020304" pitchFamily="18" charset="0"/>
+                          </a:rPr>
+                          <m:t>+</m:t>
+                        </m:r>
+                      </m:sup>
+                    </m:sSubSup>
+                  </m:oMath>
+                </a14:m>
+                <a:r>
+                  <a:rPr lang="en-SG" sz="1400" dirty="0">
+                    <a:latin typeface="Times New Roman" panose="02020603050405020304" pitchFamily="18" charset="0"/>
+                    <a:cs typeface="Times New Roman" panose="02020603050405020304" pitchFamily="18" charset="0"/>
+                  </a:rPr>
+                  <a:t> </a:t>
+                </a:r>
+              </a:p>
+              <a:p>
+                <a:r>
+                  <a:rPr lang="en-SG" sz="1400" dirty="0">
+                    <a:latin typeface="Times New Roman" panose="02020603050405020304" pitchFamily="18" charset="0"/>
+                    <a:cs typeface="Times New Roman" panose="02020603050405020304" pitchFamily="18" charset="0"/>
+                  </a:rPr>
+                  <a:t>Private Key: </a:t>
+                </a:r>
+                <a14:m>
+                  <m:oMath xmlns:m="http://schemas.openxmlformats.org/officeDocument/2006/math">
+                    <m:sSubSup>
+                      <m:sSubSupPr>
+                        <m:ctrlPr>
+                          <a:rPr lang="en-SG" sz="1400" b="1" i="1" smtClean="0">
+                            <a:latin typeface="Cambria Math" panose="02040503050406030204" pitchFamily="18" charset="0"/>
+                            <a:cs typeface="Times New Roman" panose="02020603050405020304" pitchFamily="18" charset="0"/>
+                          </a:rPr>
+                        </m:ctrlPr>
+                      </m:sSubSupPr>
+                      <m:e>
+                        <m:r>
+                          <a:rPr lang="en-SG" sz="1400" b="1" i="1" smtClean="0">
+                            <a:latin typeface="Cambria Math" panose="02040503050406030204" pitchFamily="18" charset="0"/>
+                            <a:cs typeface="Times New Roman" panose="02020603050405020304" pitchFamily="18" charset="0"/>
+                          </a:rPr>
+                          <m:t>𝑲</m:t>
+                        </m:r>
+                      </m:e>
+                      <m:sub>
+                        <m:r>
+                          <a:rPr lang="en-SG" sz="1400" b="1" i="1" smtClean="0">
+                            <a:latin typeface="Cambria Math" panose="02040503050406030204" pitchFamily="18" charset="0"/>
+                            <a:cs typeface="Times New Roman" panose="02020603050405020304" pitchFamily="18" charset="0"/>
+                          </a:rPr>
+                          <m:t>𝑺</m:t>
+                        </m:r>
+                      </m:sub>
+                      <m:sup>
+                        <m:r>
+                          <a:rPr lang="en-SG" sz="1400" b="1" i="1" smtClean="0">
+                            <a:latin typeface="Cambria Math" panose="02040503050406030204" pitchFamily="18" charset="0"/>
+                            <a:cs typeface="Times New Roman" panose="02020603050405020304" pitchFamily="18" charset="0"/>
+                          </a:rPr>
+                          <m:t>−</m:t>
+                        </m:r>
+                      </m:sup>
+                    </m:sSubSup>
+                  </m:oMath>
+                </a14:m>
+                <a:endParaRPr lang="en-SG" sz="1400" b="1" dirty="0">
+                  <a:latin typeface="Times New Roman" panose="02020603050405020304" pitchFamily="18" charset="0"/>
+                  <a:cs typeface="Times New Roman" panose="02020603050405020304" pitchFamily="18" charset="0"/>
+                </a:endParaRPr>
+              </a:p>
+              <a:p>
+                <a:r>
+                  <a:rPr lang="en-SG" sz="1400" dirty="0">
+                    <a:latin typeface="Times New Roman" panose="02020603050405020304" pitchFamily="18" charset="0"/>
+                    <a:cs typeface="Times New Roman" panose="02020603050405020304" pitchFamily="18" charset="0"/>
+                  </a:rPr>
+                  <a:t>Certificate (contains </a:t>
+                </a:r>
+                <a14:m>
+                  <m:oMath xmlns:m="http://schemas.openxmlformats.org/officeDocument/2006/math">
+                    <m:sSubSup>
+                      <m:sSubSupPr>
+                        <m:ctrlPr>
+                          <a:rPr lang="en-SG" sz="1400" b="1" i="1">
+                            <a:latin typeface="Cambria Math" panose="02040503050406030204" pitchFamily="18" charset="0"/>
+                            <a:cs typeface="Times New Roman" panose="02020603050405020304" pitchFamily="18" charset="0"/>
+                          </a:rPr>
+                        </m:ctrlPr>
+                      </m:sSubSupPr>
+                      <m:e>
+                        <m:r>
+                          <a:rPr lang="en-SG" sz="1400" b="1" i="1">
+                            <a:latin typeface="Cambria Math" panose="02040503050406030204" pitchFamily="18" charset="0"/>
+                            <a:cs typeface="Times New Roman" panose="02020603050405020304" pitchFamily="18" charset="0"/>
+                          </a:rPr>
+                          <m:t>𝑲</m:t>
+                        </m:r>
+                      </m:e>
+                      <m:sub>
+                        <m:r>
+                          <a:rPr lang="en-SG" sz="1400" b="1" i="1">
+                            <a:latin typeface="Cambria Math" panose="02040503050406030204" pitchFamily="18" charset="0"/>
+                            <a:cs typeface="Times New Roman" panose="02020603050405020304" pitchFamily="18" charset="0"/>
+                          </a:rPr>
+                          <m:t>𝒔</m:t>
+                        </m:r>
+                      </m:sub>
+                      <m:sup>
+                        <m:r>
+                          <a:rPr lang="en-SG" sz="1400" b="1" i="1">
+                            <a:latin typeface="Cambria Math" panose="02040503050406030204" pitchFamily="18" charset="0"/>
+                            <a:cs typeface="Times New Roman" panose="02020603050405020304" pitchFamily="18" charset="0"/>
+                          </a:rPr>
+                          <m:t>+</m:t>
+                        </m:r>
+                      </m:sup>
+                    </m:sSubSup>
+                  </m:oMath>
+                </a14:m>
+                <a:r>
+                  <a:rPr lang="en-SG" sz="1400" dirty="0">
+                    <a:latin typeface="Times New Roman" panose="02020603050405020304" pitchFamily="18" charset="0"/>
+                    <a:cs typeface="Times New Roman" panose="02020603050405020304" pitchFamily="18" charset="0"/>
+                  </a:rPr>
+                  <a:t> )</a:t>
+                </a:r>
+              </a:p>
+            </p:txBody>
+          </p:sp>
+        </mc:Choice>
+        <mc:Fallback xmlns="">
+          <p:sp>
+            <p:nvSpPr>
+              <p:cNvPr id="8" name="TextBox 7">
+                <a:extLst>
+                  <a:ext uri="{FF2B5EF4-FFF2-40B4-BE49-F238E27FC236}">
+                    <a16:creationId xmlns:a16="http://schemas.microsoft.com/office/drawing/2014/main" id="{26D4348F-66EB-4872-AC81-7E7CAE08BAB8}"/>
+                  </a:ext>
+                </a:extLst>
+              </p:cNvPr>
+              <p:cNvSpPr txBox="1">
+                <a:spLocks noRot="1" noChangeAspect="1" noMove="1" noResize="1" noEditPoints="1" noAdjustHandles="1" noChangeArrowheads="1" noChangeShapeType="1" noTextEdit="1"/>
+              </p:cNvSpPr>
+              <p:nvPr/>
+            </p:nvSpPr>
+            <p:spPr>
+              <a:xfrm>
+                <a:off x="4687678" y="832882"/>
+                <a:ext cx="2035557" cy="738664"/>
+              </a:xfrm>
+              <a:prstGeom prst="rect">
+                <a:avLst/>
+              </a:prstGeom>
+              <a:blipFill>
+                <a:blip r:embed="rId4"/>
+                <a:stretch>
+                  <a:fillRect l="-898" t="-1653" b="-7438"/>
+                </a:stretch>
+              </a:blipFill>
+            </p:spPr>
+            <p:txBody>
+              <a:bodyPr/>
+              <a:lstStyle/>
+              <a:p>
+                <a:r>
+                  <a:rPr lang="en-SG">
+                    <a:noFill/>
+                  </a:rPr>
+                  <a:t> </a:t>
+                </a:r>
+              </a:p>
+            </p:txBody>
+          </p:sp>
+        </mc:Fallback>
+      </mc:AlternateContent>
+      <p:cxnSp>
+        <p:nvCxnSpPr>
+          <p:cNvPr id="10" name="Straight Connector 9">
+            <a:extLst>
+              <a:ext uri="{FF2B5EF4-FFF2-40B4-BE49-F238E27FC236}">
+                <a16:creationId xmlns:a16="http://schemas.microsoft.com/office/drawing/2014/main" id="{DD840C23-3563-4A74-82B7-7EDD2895D5B9}"/>
+              </a:ext>
+            </a:extLst>
+          </p:cNvPr>
+          <p:cNvCxnSpPr>
+            <a:cxnSpLocks/>
+            <a:stCxn id="6" idx="2"/>
+          </p:cNvCxnSpPr>
+          <p:nvPr/>
+        </p:nvCxnSpPr>
+        <p:spPr>
+          <a:xfrm>
+            <a:off x="1491507" y="1259364"/>
+            <a:ext cx="0" cy="8369545"/>
+          </a:xfrm>
+          <a:prstGeom prst="line">
+            <a:avLst/>
+          </a:prstGeom>
+          <a:ln w="28575">
+            <a:solidFill>
+              <a:schemeClr val="tx1">
+                <a:lumMod val="95000"/>
+                <a:lumOff val="5000"/>
+              </a:schemeClr>
+            </a:solidFill>
+          </a:ln>
+        </p:spPr>
+        <p:style>
+          <a:lnRef idx="1">
+            <a:schemeClr val="dk1"/>
+          </a:lnRef>
+          <a:fillRef idx="0">
+            <a:schemeClr val="dk1"/>
+          </a:fillRef>
+          <a:effectRef idx="0">
+            <a:schemeClr val="dk1"/>
+          </a:effectRef>
+          <a:fontRef idx="minor">
+            <a:schemeClr val="tx1"/>
+          </a:fontRef>
+        </p:style>
+      </p:cxnSp>
+      <p:cxnSp>
+        <p:nvCxnSpPr>
+          <p:cNvPr id="11" name="Straight Connector 10">
+            <a:extLst>
+              <a:ext uri="{FF2B5EF4-FFF2-40B4-BE49-F238E27FC236}">
+                <a16:creationId xmlns:a16="http://schemas.microsoft.com/office/drawing/2014/main" id="{B5CFC0CE-D5FF-4DBF-974E-96F787353D9A}"/>
+              </a:ext>
+            </a:extLst>
+          </p:cNvPr>
+          <p:cNvCxnSpPr>
+            <a:cxnSpLocks/>
+          </p:cNvCxnSpPr>
+          <p:nvPr/>
+        </p:nvCxnSpPr>
+        <p:spPr>
+          <a:xfrm>
+            <a:off x="5384799" y="1571546"/>
+            <a:ext cx="0" cy="8057363"/>
+          </a:xfrm>
+          <a:prstGeom prst="line">
+            <a:avLst/>
+          </a:prstGeom>
+          <a:ln w="28575">
+            <a:solidFill>
+              <a:schemeClr val="tx1">
+                <a:lumMod val="95000"/>
+                <a:lumOff val="5000"/>
+              </a:schemeClr>
+            </a:solidFill>
+          </a:ln>
+        </p:spPr>
+        <p:style>
+          <a:lnRef idx="1">
+            <a:schemeClr val="dk1"/>
+          </a:lnRef>
+          <a:fillRef idx="0">
+            <a:schemeClr val="dk1"/>
+          </a:fillRef>
+          <a:effectRef idx="0">
+            <a:schemeClr val="dk1"/>
+          </a:effectRef>
+          <a:fontRef idx="minor">
+            <a:schemeClr val="tx1"/>
+          </a:fontRef>
+        </p:style>
+      </p:cxnSp>
+      <p:cxnSp>
+        <p:nvCxnSpPr>
+          <p:cNvPr id="22" name="Straight Arrow Connector 21">
+            <a:extLst>
+              <a:ext uri="{FF2B5EF4-FFF2-40B4-BE49-F238E27FC236}">
+                <a16:creationId xmlns:a16="http://schemas.microsoft.com/office/drawing/2014/main" id="{390345B3-25C4-4F27-A304-4808F7FB5E38}"/>
+              </a:ext>
+            </a:extLst>
+          </p:cNvPr>
+          <p:cNvCxnSpPr/>
+          <p:nvPr/>
+        </p:nvCxnSpPr>
+        <p:spPr>
+          <a:xfrm>
+            <a:off x="1500660" y="1502480"/>
+            <a:ext cx="3893293" cy="381000"/>
+          </a:xfrm>
+          <a:prstGeom prst="straightConnector1">
+            <a:avLst/>
+          </a:prstGeom>
+          <a:ln w="12700">
+            <a:headEnd type="none" w="med" len="med"/>
+            <a:tailEnd type="arrow" w="med" len="med"/>
+          </a:ln>
+        </p:spPr>
+        <p:style>
+          <a:lnRef idx="1">
+            <a:schemeClr val="dk1"/>
+          </a:lnRef>
+          <a:fillRef idx="0">
+            <a:schemeClr val="dk1"/>
+          </a:fillRef>
+          <a:effectRef idx="0">
+            <a:schemeClr val="dk1"/>
+          </a:effectRef>
+          <a:fontRef idx="minor">
+            <a:schemeClr val="tx1"/>
+          </a:fontRef>
+        </p:style>
+      </p:cxnSp>
+      <p:sp>
+        <p:nvSpPr>
+          <p:cNvPr id="23" name="TextBox 22">
+            <a:extLst>
+              <a:ext uri="{FF2B5EF4-FFF2-40B4-BE49-F238E27FC236}">
+                <a16:creationId xmlns:a16="http://schemas.microsoft.com/office/drawing/2014/main" id="{661F4A5F-B27D-4A03-8CD5-E432B10DB72B}"/>
+              </a:ext>
+            </a:extLst>
+          </p:cNvPr>
+          <p:cNvSpPr txBox="1"/>
+          <p:nvPr/>
+        </p:nvSpPr>
+        <p:spPr>
+          <a:xfrm rot="324564">
+            <a:off x="2600322" y="1402556"/>
+            <a:ext cx="1842171" cy="307777"/>
+          </a:xfrm>
+          <a:prstGeom prst="rect">
+            <a:avLst/>
+          </a:prstGeom>
+          <a:noFill/>
+        </p:spPr>
+        <p:txBody>
+          <a:bodyPr wrap="none" rtlCol="0">
+            <a:spAutoFit/>
+          </a:bodyPr>
+          <a:lstStyle/>
+          <a:p>
+            <a:r>
+              <a:rPr lang="en-SG" sz="1400" dirty="0">
+                <a:latin typeface="Times New Roman" panose="02020603050405020304" pitchFamily="18" charset="0"/>
+                <a:cs typeface="Times New Roman" panose="02020603050405020304" pitchFamily="18" charset="0"/>
+              </a:rPr>
+              <a:t>Client generated nonce</a:t>
+            </a:r>
+          </a:p>
+        </p:txBody>
+      </p:sp>
+      <p:cxnSp>
+        <p:nvCxnSpPr>
+          <p:cNvPr id="24" name="Straight Arrow Connector 23">
+            <a:extLst>
+              <a:ext uri="{FF2B5EF4-FFF2-40B4-BE49-F238E27FC236}">
+                <a16:creationId xmlns:a16="http://schemas.microsoft.com/office/drawing/2014/main" id="{8705B0E8-02F0-4116-AF43-CCD293F40363}"/>
+              </a:ext>
+            </a:extLst>
+          </p:cNvPr>
+          <p:cNvCxnSpPr>
+            <a:cxnSpLocks/>
+          </p:cNvCxnSpPr>
+          <p:nvPr/>
+        </p:nvCxnSpPr>
+        <p:spPr>
+          <a:xfrm flipH="1">
+            <a:off x="1490134" y="2128175"/>
+            <a:ext cx="3884140" cy="369916"/>
+          </a:xfrm>
+          <a:prstGeom prst="straightConnector1">
+            <a:avLst/>
+          </a:prstGeom>
+          <a:ln w="12700">
+            <a:headEnd type="none" w="med" len="med"/>
+            <a:tailEnd type="arrow" w="med" len="med"/>
+          </a:ln>
+        </p:spPr>
+        <p:style>
+          <a:lnRef idx="1">
+            <a:schemeClr val="dk1"/>
+          </a:lnRef>
+          <a:fillRef idx="0">
+            <a:schemeClr val="dk1"/>
+          </a:fillRef>
+          <a:effectRef idx="0">
+            <a:schemeClr val="dk1"/>
+          </a:effectRef>
+          <a:fontRef idx="minor">
+            <a:schemeClr val="tx1"/>
+          </a:fontRef>
+        </p:style>
+      </p:cxnSp>
+      <mc:AlternateContent xmlns:mc="http://schemas.openxmlformats.org/markup-compatibility/2006" xmlns:a14="http://schemas.microsoft.com/office/drawing/2010/main">
+        <mc:Choice Requires="a14">
+          <p:sp>
+            <p:nvSpPr>
+              <p:cNvPr id="25" name="TextBox 24">
+                <a:extLst>
+                  <a:ext uri="{FF2B5EF4-FFF2-40B4-BE49-F238E27FC236}">
+                    <a16:creationId xmlns:a16="http://schemas.microsoft.com/office/drawing/2014/main" id="{A444AABD-40A8-46EB-8EF1-96353FA0166D}"/>
+                  </a:ext>
+                </a:extLst>
+              </p:cNvPr>
+              <p:cNvSpPr txBox="1"/>
+              <p:nvPr/>
+            </p:nvSpPr>
+            <p:spPr>
+              <a:xfrm rot="21274454">
+                <a:off x="2742732" y="1985172"/>
+                <a:ext cx="1484124" cy="307777"/>
+              </a:xfrm>
+              <a:prstGeom prst="rect">
+                <a:avLst/>
+              </a:prstGeom>
+              <a:noFill/>
+            </p:spPr>
+            <p:txBody>
+              <a:bodyPr wrap="none" rtlCol="0">
+                <a:spAutoFit/>
+              </a:bodyPr>
+              <a:lstStyle/>
+              <a:p>
+                <a:r>
+                  <a:rPr lang="en-SG" sz="1400" dirty="0">
+                    <a:latin typeface="Times New Roman" panose="02020603050405020304" pitchFamily="18" charset="0"/>
+                    <a:cs typeface="Times New Roman" panose="02020603050405020304" pitchFamily="18" charset="0"/>
+                  </a:rPr>
+                  <a:t>R =</a:t>
+                </a:r>
+                <a:r>
+                  <a:rPr lang="en-SG" sz="1400" b="1" dirty="0">
+                    <a:latin typeface="Times New Roman" panose="02020603050405020304" pitchFamily="18" charset="0"/>
+                    <a:cs typeface="Times New Roman" panose="02020603050405020304" pitchFamily="18" charset="0"/>
+                  </a:rPr>
+                  <a:t> </a:t>
+                </a:r>
+                <a14:m>
+                  <m:oMath xmlns:m="http://schemas.openxmlformats.org/officeDocument/2006/math">
+                    <m:sSubSup>
+                      <m:sSubSupPr>
+                        <m:ctrlPr>
+                          <a:rPr lang="en-SG" sz="1400" b="1" i="1" smtClean="0">
+                            <a:latin typeface="Cambria Math" panose="02040503050406030204" pitchFamily="18" charset="0"/>
+                            <a:cs typeface="Times New Roman" panose="02020603050405020304" pitchFamily="18" charset="0"/>
+                          </a:rPr>
+                        </m:ctrlPr>
+                      </m:sSubSupPr>
+                      <m:e>
+                        <m:r>
+                          <a:rPr lang="en-SG" sz="1400" b="1" i="1">
+                            <a:latin typeface="Cambria Math" panose="02040503050406030204" pitchFamily="18" charset="0"/>
+                            <a:cs typeface="Times New Roman" panose="02020603050405020304" pitchFamily="18" charset="0"/>
+                          </a:rPr>
+                          <m:t>𝑲</m:t>
+                        </m:r>
+                      </m:e>
+                      <m:sub>
+                        <m:r>
+                          <a:rPr lang="en-SG" sz="1400" b="1" i="1">
+                            <a:latin typeface="Cambria Math" panose="02040503050406030204" pitchFamily="18" charset="0"/>
+                            <a:cs typeface="Times New Roman" panose="02020603050405020304" pitchFamily="18" charset="0"/>
+                          </a:rPr>
+                          <m:t>𝑺</m:t>
+                        </m:r>
+                      </m:sub>
+                      <m:sup>
+                        <m:r>
+                          <a:rPr lang="en-SG" sz="1400" b="1" i="1">
+                            <a:latin typeface="Cambria Math" panose="02040503050406030204" pitchFamily="18" charset="0"/>
+                            <a:cs typeface="Times New Roman" panose="02020603050405020304" pitchFamily="18" charset="0"/>
+                          </a:rPr>
+                          <m:t>−</m:t>
+                        </m:r>
+                      </m:sup>
+                    </m:sSubSup>
+                  </m:oMath>
+                </a14:m>
+                <a:r>
+                  <a:rPr lang="en-SG" sz="1400" dirty="0">
+                    <a:latin typeface="Times New Roman" panose="02020603050405020304" pitchFamily="18" charset="0"/>
+                    <a:cs typeface="Times New Roman" panose="02020603050405020304" pitchFamily="18" charset="0"/>
+                  </a:rPr>
+                  <a:t>{ nonce } </a:t>
+                </a:r>
+              </a:p>
+            </p:txBody>
+          </p:sp>
+        </mc:Choice>
+        <mc:Fallback xmlns="">
+          <p:sp>
+            <p:nvSpPr>
+              <p:cNvPr id="25" name="TextBox 24">
+                <a:extLst>
+                  <a:ext uri="{FF2B5EF4-FFF2-40B4-BE49-F238E27FC236}">
+                    <a16:creationId xmlns:a16="http://schemas.microsoft.com/office/drawing/2014/main" id="{A444AABD-40A8-46EB-8EF1-96353FA0166D}"/>
+                  </a:ext>
+                </a:extLst>
+              </p:cNvPr>
+              <p:cNvSpPr txBox="1">
+                <a:spLocks noRot="1" noChangeAspect="1" noMove="1" noResize="1" noEditPoints="1" noAdjustHandles="1" noChangeArrowheads="1" noChangeShapeType="1" noTextEdit="1"/>
+              </p:cNvSpPr>
+              <p:nvPr/>
+            </p:nvSpPr>
+            <p:spPr>
+              <a:xfrm rot="21274454">
+                <a:off x="2742732" y="1985172"/>
+                <a:ext cx="1484124" cy="307777"/>
+              </a:xfrm>
+              <a:prstGeom prst="rect">
+                <a:avLst/>
+              </a:prstGeom>
+              <a:blipFill>
+                <a:blip r:embed="rId5"/>
+                <a:stretch>
+                  <a:fillRect l="-1210" t="-1351" b="-13514"/>
+                </a:stretch>
+              </a:blipFill>
+            </p:spPr>
+            <p:txBody>
+              <a:bodyPr/>
+              <a:lstStyle/>
+              <a:p>
+                <a:r>
+                  <a:rPr lang="en-SG">
+                    <a:noFill/>
+                  </a:rPr>
+                  <a:t> </a:t>
+                </a:r>
+              </a:p>
+            </p:txBody>
+          </p:sp>
+        </mc:Fallback>
+      </mc:AlternateContent>
+      <p:cxnSp>
+        <p:nvCxnSpPr>
+          <p:cNvPr id="26" name="Straight Arrow Connector 25">
+            <a:extLst>
+              <a:ext uri="{FF2B5EF4-FFF2-40B4-BE49-F238E27FC236}">
+                <a16:creationId xmlns:a16="http://schemas.microsoft.com/office/drawing/2014/main" id="{EDD3A151-2718-4CFB-A0CF-65209AC4C0C8}"/>
+              </a:ext>
+            </a:extLst>
+          </p:cNvPr>
+          <p:cNvCxnSpPr/>
+          <p:nvPr/>
+        </p:nvCxnSpPr>
+        <p:spPr>
+          <a:xfrm>
+            <a:off x="1500660" y="2770786"/>
+            <a:ext cx="3893293" cy="381000"/>
+          </a:xfrm>
+          <a:prstGeom prst="straightConnector1">
+            <a:avLst/>
+          </a:prstGeom>
+          <a:ln w="12700">
+            <a:headEnd type="none" w="med" len="med"/>
+            <a:tailEnd type="arrow" w="med" len="med"/>
+          </a:ln>
+        </p:spPr>
+        <p:style>
+          <a:lnRef idx="1">
+            <a:schemeClr val="dk1"/>
+          </a:lnRef>
+          <a:fillRef idx="0">
+            <a:schemeClr val="dk1"/>
+          </a:fillRef>
+          <a:effectRef idx="0">
+            <a:schemeClr val="dk1"/>
+          </a:effectRef>
+          <a:fontRef idx="minor">
+            <a:schemeClr val="tx1"/>
+          </a:fontRef>
+        </p:style>
+      </p:cxnSp>
+      <p:sp>
+        <p:nvSpPr>
+          <p:cNvPr id="27" name="TextBox 26">
+            <a:extLst>
+              <a:ext uri="{FF2B5EF4-FFF2-40B4-BE49-F238E27FC236}">
+                <a16:creationId xmlns:a16="http://schemas.microsoft.com/office/drawing/2014/main" id="{7DF98170-A59B-4D5C-A41F-EFCA9C4804FF}"/>
+              </a:ext>
+            </a:extLst>
+          </p:cNvPr>
+          <p:cNvSpPr txBox="1"/>
+          <p:nvPr/>
+        </p:nvSpPr>
+        <p:spPr>
+          <a:xfrm rot="324564">
+            <a:off x="1959924" y="2670862"/>
+            <a:ext cx="3122971" cy="307777"/>
+          </a:xfrm>
+          <a:prstGeom prst="rect">
+            <a:avLst/>
+          </a:prstGeom>
+          <a:noFill/>
+        </p:spPr>
+        <p:txBody>
+          <a:bodyPr wrap="none" rtlCol="0">
+            <a:spAutoFit/>
+          </a:bodyPr>
+          <a:lstStyle/>
+          <a:p>
+            <a:r>
+              <a:rPr lang="en-SG" sz="1400" dirty="0">
+                <a:latin typeface="Times New Roman" panose="02020603050405020304" pitchFamily="18" charset="0"/>
+                <a:cs typeface="Times New Roman" panose="02020603050405020304" pitchFamily="18" charset="0"/>
+              </a:rPr>
+              <a:t>“Give me your certificate signed by CA”</a:t>
+            </a:r>
+          </a:p>
+        </p:txBody>
+      </p:sp>
+      <p:cxnSp>
+        <p:nvCxnSpPr>
+          <p:cNvPr id="28" name="Straight Arrow Connector 27">
+            <a:extLst>
+              <a:ext uri="{FF2B5EF4-FFF2-40B4-BE49-F238E27FC236}">
+                <a16:creationId xmlns:a16="http://schemas.microsoft.com/office/drawing/2014/main" id="{98D1AB3D-CDB1-47AF-8B05-953ABB4DFCF7}"/>
+              </a:ext>
+            </a:extLst>
+          </p:cNvPr>
+          <p:cNvCxnSpPr>
+            <a:cxnSpLocks/>
+          </p:cNvCxnSpPr>
+          <p:nvPr/>
+        </p:nvCxnSpPr>
+        <p:spPr>
+          <a:xfrm flipH="1">
+            <a:off x="1509813" y="3344560"/>
+            <a:ext cx="3884140" cy="369916"/>
+          </a:xfrm>
+          <a:prstGeom prst="straightConnector1">
+            <a:avLst/>
+          </a:prstGeom>
+          <a:ln w="12700">
+            <a:headEnd type="none" w="med" len="med"/>
+            <a:tailEnd type="arrow" w="med" len="med"/>
+          </a:ln>
+        </p:spPr>
+        <p:style>
+          <a:lnRef idx="1">
+            <a:schemeClr val="dk1"/>
+          </a:lnRef>
+          <a:fillRef idx="0">
+            <a:schemeClr val="dk1"/>
+          </a:fillRef>
+          <a:effectRef idx="0">
+            <a:schemeClr val="dk1"/>
+          </a:effectRef>
+          <a:fontRef idx="minor">
+            <a:schemeClr val="tx1"/>
+          </a:fontRef>
+        </p:style>
+      </p:cxnSp>
+      <p:sp>
+        <p:nvSpPr>
+          <p:cNvPr id="29" name="TextBox 28">
+            <a:extLst>
+              <a:ext uri="{FF2B5EF4-FFF2-40B4-BE49-F238E27FC236}">
+                <a16:creationId xmlns:a16="http://schemas.microsoft.com/office/drawing/2014/main" id="{EE61C840-BA79-4046-A51D-834BFFBAF75C}"/>
+              </a:ext>
+            </a:extLst>
+          </p:cNvPr>
+          <p:cNvSpPr txBox="1"/>
+          <p:nvPr/>
+        </p:nvSpPr>
+        <p:spPr>
+          <a:xfrm rot="21274454">
+            <a:off x="2492921" y="3201557"/>
+            <a:ext cx="2056973" cy="307777"/>
+          </a:xfrm>
+          <a:prstGeom prst="rect">
+            <a:avLst/>
+          </a:prstGeom>
+          <a:noFill/>
+        </p:spPr>
+        <p:txBody>
+          <a:bodyPr wrap="none" rtlCol="0">
+            <a:spAutoFit/>
+          </a:bodyPr>
+          <a:lstStyle/>
+          <a:p>
+            <a:r>
+              <a:rPr lang="en-SG" sz="1400" dirty="0">
+                <a:latin typeface="Times New Roman" panose="02020603050405020304" pitchFamily="18" charset="0"/>
+                <a:cs typeface="Times New Roman" panose="02020603050405020304" pitchFamily="18" charset="0"/>
+              </a:rPr>
+              <a:t>Server’s signed certificate</a:t>
+            </a:r>
+          </a:p>
+        </p:txBody>
+      </p:sp>
+      <mc:AlternateContent xmlns:mc="http://schemas.openxmlformats.org/markup-compatibility/2006" xmlns:a14="http://schemas.microsoft.com/office/drawing/2010/main">
+        <mc:Choice Requires="a14">
+          <p:sp>
+            <p:nvSpPr>
+              <p:cNvPr id="30" name="TextBox 29">
+                <a:extLst>
+                  <a:ext uri="{FF2B5EF4-FFF2-40B4-BE49-F238E27FC236}">
+                    <a16:creationId xmlns:a16="http://schemas.microsoft.com/office/drawing/2014/main" id="{ADF5B2B4-7667-4988-A95C-6BD4B56C0FB1}"/>
+                  </a:ext>
+                </a:extLst>
+              </p:cNvPr>
+              <p:cNvSpPr txBox="1"/>
+              <p:nvPr/>
+            </p:nvSpPr>
+            <p:spPr>
+              <a:xfrm>
+                <a:off x="-2391259" y="3299836"/>
+                <a:ext cx="3716257" cy="1388650"/>
+              </a:xfrm>
+              <a:prstGeom prst="rect">
+                <a:avLst/>
+              </a:prstGeom>
+              <a:noFill/>
+              <a:ln>
+                <a:solidFill>
+                  <a:schemeClr val="tx1"/>
+                </a:solidFill>
+              </a:ln>
+            </p:spPr>
+            <p:txBody>
+              <a:bodyPr wrap="square" rtlCol="0">
+                <a:spAutoFit/>
+              </a:bodyPr>
+              <a:lstStyle/>
+              <a:p>
+                <a:r>
+                  <a:rPr lang="en-SG" sz="1400" dirty="0">
+                    <a:latin typeface="Times New Roman" panose="02020603050405020304" pitchFamily="18" charset="0"/>
+                    <a:cs typeface="Times New Roman" panose="02020603050405020304" pitchFamily="18" charset="0"/>
+                  </a:rPr>
+                  <a:t>Checking:</a:t>
+                </a:r>
+              </a:p>
+              <a:p>
+                <a:r>
+                  <a:rPr lang="en-SG" sz="1400" dirty="0">
+                    <a:latin typeface="Times New Roman" panose="02020603050405020304" pitchFamily="18" charset="0"/>
+                    <a:cs typeface="Times New Roman" panose="02020603050405020304" pitchFamily="18" charset="0"/>
+                  </a:rPr>
+                  <a:t>- Extract CA’s public key from CACSE.crt</a:t>
+                </a:r>
+              </a:p>
+              <a:p>
+                <a:r>
+                  <a:rPr lang="en-SG" sz="1400" dirty="0">
+                    <a:latin typeface="Times New Roman" panose="02020603050405020304" pitchFamily="18" charset="0"/>
+                    <a:cs typeface="Times New Roman" panose="02020603050405020304" pitchFamily="18" charset="0"/>
+                  </a:rPr>
+                  <a:t>- Verify Server’s cert with CA’s public key (</a:t>
+                </a:r>
+                <a14:m>
+                  <m:oMath xmlns:m="http://schemas.openxmlformats.org/officeDocument/2006/math">
+                    <m:sSubSup>
+                      <m:sSubSupPr>
+                        <m:ctrlPr>
+                          <a:rPr lang="en-SG" sz="1400" b="1" i="1">
+                            <a:latin typeface="Cambria Math" panose="02040503050406030204" pitchFamily="18" charset="0"/>
+                            <a:cs typeface="Times New Roman" panose="02020603050405020304" pitchFamily="18" charset="0"/>
+                          </a:rPr>
+                        </m:ctrlPr>
+                      </m:sSubSupPr>
+                      <m:e>
+                        <m:r>
+                          <a:rPr lang="en-SG" sz="1400" b="1" i="1">
+                            <a:latin typeface="Cambria Math" panose="02040503050406030204" pitchFamily="18" charset="0"/>
+                            <a:cs typeface="Times New Roman" panose="02020603050405020304" pitchFamily="18" charset="0"/>
+                          </a:rPr>
+                          <m:t>𝑲</m:t>
+                        </m:r>
+                      </m:e>
+                      <m:sub>
+                        <m:r>
+                          <a:rPr lang="en-SG" sz="1400" b="1" i="1" smtClean="0">
+                            <a:latin typeface="Cambria Math" panose="02040503050406030204" pitchFamily="18" charset="0"/>
+                            <a:cs typeface="Times New Roman" panose="02020603050405020304" pitchFamily="18" charset="0"/>
+                          </a:rPr>
+                          <m:t>𝑪𝑨</m:t>
+                        </m:r>
+                      </m:sub>
+                      <m:sup>
+                        <m:r>
+                          <a:rPr lang="en-SG" sz="1400" b="1" i="1">
+                            <a:latin typeface="Cambria Math" panose="02040503050406030204" pitchFamily="18" charset="0"/>
+                            <a:cs typeface="Times New Roman" panose="02020603050405020304" pitchFamily="18" charset="0"/>
+                          </a:rPr>
+                          <m:t>+</m:t>
+                        </m:r>
+                      </m:sup>
+                    </m:sSubSup>
+                  </m:oMath>
+                </a14:m>
+                <a:r>
+                  <a:rPr lang="en-SG" sz="1400" dirty="0">
+                    <a:latin typeface="Times New Roman" panose="02020603050405020304" pitchFamily="18" charset="0"/>
+                    <a:cs typeface="Times New Roman" panose="02020603050405020304" pitchFamily="18" charset="0"/>
+                  </a:rPr>
+                  <a:t>) </a:t>
+                </a:r>
+              </a:p>
+              <a:p>
+                <a:r>
+                  <a:rPr lang="en-SG" sz="1400" dirty="0">
+                    <a:latin typeface="Times New Roman" panose="02020603050405020304" pitchFamily="18" charset="0"/>
+                    <a:cs typeface="Times New Roman" panose="02020603050405020304" pitchFamily="18" charset="0"/>
+                  </a:rPr>
+                  <a:t>- Extract </a:t>
+                </a:r>
+                <a14:m>
+                  <m:oMath xmlns:m="http://schemas.openxmlformats.org/officeDocument/2006/math">
+                    <m:sSubSup>
+                      <m:sSubSupPr>
+                        <m:ctrlPr>
+                          <a:rPr lang="en-SG" sz="1400" b="1" i="1">
+                            <a:latin typeface="Cambria Math" panose="02040503050406030204" pitchFamily="18" charset="0"/>
+                            <a:cs typeface="Times New Roman" panose="02020603050405020304" pitchFamily="18" charset="0"/>
+                          </a:rPr>
+                        </m:ctrlPr>
+                      </m:sSubSupPr>
+                      <m:e>
+                        <m:r>
+                          <a:rPr lang="en-SG" sz="1400" b="1" i="1">
+                            <a:latin typeface="Cambria Math" panose="02040503050406030204" pitchFamily="18" charset="0"/>
+                            <a:cs typeface="Times New Roman" panose="02020603050405020304" pitchFamily="18" charset="0"/>
+                          </a:rPr>
+                          <m:t>𝑲</m:t>
+                        </m:r>
+                      </m:e>
+                      <m:sub>
+                        <m:r>
+                          <a:rPr lang="en-SG" sz="1400" b="1" i="1">
+                            <a:latin typeface="Cambria Math" panose="02040503050406030204" pitchFamily="18" charset="0"/>
+                            <a:cs typeface="Times New Roman" panose="02020603050405020304" pitchFamily="18" charset="0"/>
+                          </a:rPr>
+                          <m:t>𝒔</m:t>
+                        </m:r>
+                      </m:sub>
+                      <m:sup>
+                        <m:r>
+                          <a:rPr lang="en-SG" sz="1400" b="1" i="1">
+                            <a:latin typeface="Cambria Math" panose="02040503050406030204" pitchFamily="18" charset="0"/>
+                            <a:cs typeface="Times New Roman" panose="02020603050405020304" pitchFamily="18" charset="0"/>
+                          </a:rPr>
+                          <m:t>+</m:t>
+                        </m:r>
+                      </m:sup>
+                    </m:sSubSup>
+                  </m:oMath>
+                </a14:m>
+                <a:endParaRPr lang="en-SG" sz="1400" dirty="0">
+                  <a:latin typeface="Times New Roman" panose="02020603050405020304" pitchFamily="18" charset="0"/>
+                  <a:cs typeface="Times New Roman" panose="02020603050405020304" pitchFamily="18" charset="0"/>
+                </a:endParaRPr>
+              </a:p>
+              <a:p>
+                <a:r>
+                  <a:rPr lang="en-SG" sz="1400" dirty="0">
+                    <a:latin typeface="Times New Roman" panose="02020603050405020304" pitchFamily="18" charset="0"/>
+                    <a:cs typeface="Times New Roman" panose="02020603050405020304" pitchFamily="18" charset="0"/>
+                  </a:rPr>
+                  <a:t>- Compute </a:t>
+                </a:r>
+                <a14:m>
+                  <m:oMath xmlns:m="http://schemas.openxmlformats.org/officeDocument/2006/math">
+                    <m:sSubSup>
+                      <m:sSubSupPr>
+                        <m:ctrlPr>
+                          <a:rPr lang="en-SG" sz="1400" b="1" i="1">
+                            <a:latin typeface="Cambria Math" panose="02040503050406030204" pitchFamily="18" charset="0"/>
+                            <a:cs typeface="Times New Roman" panose="02020603050405020304" pitchFamily="18" charset="0"/>
+                          </a:rPr>
+                        </m:ctrlPr>
+                      </m:sSubSupPr>
+                      <m:e>
+                        <m:r>
+                          <a:rPr lang="en-SG" sz="1400" b="1" i="1">
+                            <a:latin typeface="Cambria Math" panose="02040503050406030204" pitchFamily="18" charset="0"/>
+                            <a:cs typeface="Times New Roman" panose="02020603050405020304" pitchFamily="18" charset="0"/>
+                          </a:rPr>
+                          <m:t>𝑲</m:t>
+                        </m:r>
+                      </m:e>
+                      <m:sub>
+                        <m:r>
+                          <a:rPr lang="en-SG" sz="1400" b="1" i="1">
+                            <a:latin typeface="Cambria Math" panose="02040503050406030204" pitchFamily="18" charset="0"/>
+                            <a:cs typeface="Times New Roman" panose="02020603050405020304" pitchFamily="18" charset="0"/>
+                          </a:rPr>
+                          <m:t>𝒔</m:t>
+                        </m:r>
+                      </m:sub>
+                      <m:sup>
+                        <m:r>
+                          <a:rPr lang="en-SG" sz="1400" b="1" i="1">
+                            <a:latin typeface="Cambria Math" panose="02040503050406030204" pitchFamily="18" charset="0"/>
+                            <a:cs typeface="Times New Roman" panose="02020603050405020304" pitchFamily="18" charset="0"/>
+                          </a:rPr>
+                          <m:t>+</m:t>
+                        </m:r>
+                      </m:sup>
+                    </m:sSubSup>
+                  </m:oMath>
+                </a14:m>
+                <a:r>
+                  <a:rPr lang="en-SG" sz="1400" dirty="0">
+                    <a:latin typeface="Times New Roman" panose="02020603050405020304" pitchFamily="18" charset="0"/>
+                    <a:cs typeface="Times New Roman" panose="02020603050405020304" pitchFamily="18" charset="0"/>
+                  </a:rPr>
+                  <a:t> (</a:t>
+                </a:r>
+                <a14:m>
+                  <m:oMath xmlns:m="http://schemas.openxmlformats.org/officeDocument/2006/math">
+                    <m:sSubSup>
+                      <m:sSubSupPr>
+                        <m:ctrlPr>
+                          <a:rPr lang="en-SG" sz="1400" b="1" i="1">
+                            <a:latin typeface="Cambria Math" panose="02040503050406030204" pitchFamily="18" charset="0"/>
+                            <a:cs typeface="Times New Roman" panose="02020603050405020304" pitchFamily="18" charset="0"/>
+                          </a:rPr>
+                        </m:ctrlPr>
+                      </m:sSubSupPr>
+                      <m:e>
+                        <m:r>
+                          <a:rPr lang="en-SG" sz="1400" b="1" i="1">
+                            <a:latin typeface="Cambria Math" panose="02040503050406030204" pitchFamily="18" charset="0"/>
+                            <a:cs typeface="Times New Roman" panose="02020603050405020304" pitchFamily="18" charset="0"/>
+                          </a:rPr>
+                          <m:t>𝑲</m:t>
+                        </m:r>
+                      </m:e>
+                      <m:sub>
+                        <m:r>
+                          <a:rPr lang="en-SG" sz="1400" b="1" i="1">
+                            <a:latin typeface="Cambria Math" panose="02040503050406030204" pitchFamily="18" charset="0"/>
+                            <a:cs typeface="Times New Roman" panose="02020603050405020304" pitchFamily="18" charset="0"/>
+                          </a:rPr>
+                          <m:t>𝑺</m:t>
+                        </m:r>
+                      </m:sub>
+                      <m:sup>
+                        <m:r>
+                          <a:rPr lang="en-SG" sz="1400" b="1" i="1">
+                            <a:latin typeface="Cambria Math" panose="02040503050406030204" pitchFamily="18" charset="0"/>
+                            <a:cs typeface="Times New Roman" panose="02020603050405020304" pitchFamily="18" charset="0"/>
+                          </a:rPr>
+                          <m:t>−</m:t>
+                        </m:r>
+                      </m:sup>
+                    </m:sSubSup>
+                  </m:oMath>
+                </a14:m>
+                <a:r>
+                  <a:rPr lang="en-SG" sz="1400" dirty="0">
+                    <a:latin typeface="Times New Roman" panose="02020603050405020304" pitchFamily="18" charset="0"/>
+                    <a:cs typeface="Times New Roman" panose="02020603050405020304" pitchFamily="18" charset="0"/>
+                  </a:rPr>
+                  <a:t>{ nonce })</a:t>
+                </a:r>
+              </a:p>
+              <a:p>
+                <a:r>
+                  <a:rPr lang="en-SG" sz="1400" dirty="0">
+                    <a:latin typeface="Times New Roman" panose="02020603050405020304" pitchFamily="18" charset="0"/>
+                    <a:cs typeface="Times New Roman" panose="02020603050405020304" pitchFamily="18" charset="0"/>
+                  </a:rPr>
+                  <a:t>- Check that </a:t>
+                </a:r>
+                <a14:m>
+                  <m:oMath xmlns:m="http://schemas.openxmlformats.org/officeDocument/2006/math">
+                    <m:sSubSup>
+                      <m:sSubSupPr>
+                        <m:ctrlPr>
+                          <a:rPr lang="en-SG" sz="1400" b="1" i="1">
+                            <a:latin typeface="Cambria Math" panose="02040503050406030204" pitchFamily="18" charset="0"/>
+                            <a:cs typeface="Times New Roman" panose="02020603050405020304" pitchFamily="18" charset="0"/>
+                          </a:rPr>
+                        </m:ctrlPr>
+                      </m:sSubSupPr>
+                      <m:e>
+                        <m:r>
+                          <a:rPr lang="en-SG" sz="1400" b="1" i="1">
+                            <a:latin typeface="Cambria Math" panose="02040503050406030204" pitchFamily="18" charset="0"/>
+                            <a:cs typeface="Times New Roman" panose="02020603050405020304" pitchFamily="18" charset="0"/>
+                          </a:rPr>
+                          <m:t>𝑲</m:t>
+                        </m:r>
+                      </m:e>
+                      <m:sub>
+                        <m:r>
+                          <a:rPr lang="en-SG" sz="1400" b="1" i="1">
+                            <a:latin typeface="Cambria Math" panose="02040503050406030204" pitchFamily="18" charset="0"/>
+                            <a:cs typeface="Times New Roman" panose="02020603050405020304" pitchFamily="18" charset="0"/>
+                          </a:rPr>
+                          <m:t>𝒔</m:t>
+                        </m:r>
+                      </m:sub>
+                      <m:sup>
+                        <m:r>
+                          <a:rPr lang="en-SG" sz="1400" b="1" i="1">
+                            <a:latin typeface="Cambria Math" panose="02040503050406030204" pitchFamily="18" charset="0"/>
+                            <a:cs typeface="Times New Roman" panose="02020603050405020304" pitchFamily="18" charset="0"/>
+                          </a:rPr>
+                          <m:t>+</m:t>
+                        </m:r>
+                      </m:sup>
+                    </m:sSubSup>
+                  </m:oMath>
+                </a14:m>
+                <a:r>
+                  <a:rPr lang="en-SG" sz="1400" dirty="0">
+                    <a:latin typeface="Times New Roman" panose="02020603050405020304" pitchFamily="18" charset="0"/>
+                    <a:cs typeface="Times New Roman" panose="02020603050405020304" pitchFamily="18" charset="0"/>
+                  </a:rPr>
+                  <a:t> (</a:t>
+                </a:r>
+                <a14:m>
+                  <m:oMath xmlns:m="http://schemas.openxmlformats.org/officeDocument/2006/math">
+                    <m:sSubSup>
+                      <m:sSubSupPr>
+                        <m:ctrlPr>
+                          <a:rPr lang="en-SG" sz="1400" b="1" i="1">
+                            <a:latin typeface="Cambria Math" panose="02040503050406030204" pitchFamily="18" charset="0"/>
+                            <a:cs typeface="Times New Roman" panose="02020603050405020304" pitchFamily="18" charset="0"/>
+                          </a:rPr>
+                        </m:ctrlPr>
+                      </m:sSubSupPr>
+                      <m:e>
+                        <m:r>
+                          <a:rPr lang="en-SG" sz="1400" b="1" i="1">
+                            <a:latin typeface="Cambria Math" panose="02040503050406030204" pitchFamily="18" charset="0"/>
+                            <a:cs typeface="Times New Roman" panose="02020603050405020304" pitchFamily="18" charset="0"/>
+                          </a:rPr>
+                          <m:t>𝑲</m:t>
+                        </m:r>
+                      </m:e>
+                      <m:sub>
+                        <m:r>
+                          <a:rPr lang="en-SG" sz="1400" b="1" i="1">
+                            <a:latin typeface="Cambria Math" panose="02040503050406030204" pitchFamily="18" charset="0"/>
+                            <a:cs typeface="Times New Roman" panose="02020603050405020304" pitchFamily="18" charset="0"/>
+                          </a:rPr>
+                          <m:t>𝑺</m:t>
+                        </m:r>
+                      </m:sub>
+                      <m:sup>
+                        <m:r>
+                          <a:rPr lang="en-SG" sz="1400" b="1" i="1">
+                            <a:latin typeface="Cambria Math" panose="02040503050406030204" pitchFamily="18" charset="0"/>
+                            <a:cs typeface="Times New Roman" panose="02020603050405020304" pitchFamily="18" charset="0"/>
+                          </a:rPr>
+                          <m:t>−</m:t>
+                        </m:r>
+                      </m:sup>
+                    </m:sSubSup>
+                  </m:oMath>
+                </a14:m>
+                <a:r>
+                  <a:rPr lang="en-SG" sz="1400" dirty="0">
+                    <a:latin typeface="Times New Roman" panose="02020603050405020304" pitchFamily="18" charset="0"/>
+                    <a:cs typeface="Times New Roman" panose="02020603050405020304" pitchFamily="18" charset="0"/>
+                  </a:rPr>
+                  <a:t>{ nonce }) = nonce</a:t>
+                </a:r>
+              </a:p>
+            </p:txBody>
+          </p:sp>
+        </mc:Choice>
+        <mc:Fallback xmlns="">
+          <p:sp>
+            <p:nvSpPr>
+              <p:cNvPr id="30" name="TextBox 29">
+                <a:extLst>
+                  <a:ext uri="{FF2B5EF4-FFF2-40B4-BE49-F238E27FC236}">
+                    <a16:creationId xmlns:a16="http://schemas.microsoft.com/office/drawing/2014/main" id="{ADF5B2B4-7667-4988-A95C-6BD4B56C0FB1}"/>
+                  </a:ext>
+                </a:extLst>
+              </p:cNvPr>
+              <p:cNvSpPr txBox="1">
+                <a:spLocks noRot="1" noChangeAspect="1" noMove="1" noResize="1" noEditPoints="1" noAdjustHandles="1" noChangeArrowheads="1" noChangeShapeType="1" noTextEdit="1"/>
+              </p:cNvSpPr>
+              <p:nvPr/>
+            </p:nvSpPr>
+            <p:spPr>
+              <a:xfrm>
+                <a:off x="-2391259" y="3299836"/>
+                <a:ext cx="3716257" cy="1388650"/>
+              </a:xfrm>
+              <a:prstGeom prst="rect">
+                <a:avLst/>
+              </a:prstGeom>
+              <a:blipFill>
+                <a:blip r:embed="rId6"/>
+                <a:stretch>
+                  <a:fillRect l="-327" r="-818" b="-3478"/>
+                </a:stretch>
+              </a:blipFill>
+              <a:ln>
+                <a:solidFill>
+                  <a:schemeClr val="tx1"/>
+                </a:solidFill>
+              </a:ln>
+            </p:spPr>
+            <p:txBody>
+              <a:bodyPr/>
+              <a:lstStyle/>
+              <a:p>
+                <a:r>
+                  <a:rPr lang="en-SG">
+                    <a:noFill/>
+                  </a:rPr>
+                  <a:t> </a:t>
+                </a:r>
+              </a:p>
+            </p:txBody>
+          </p:sp>
+        </mc:Fallback>
+      </mc:AlternateContent>
+      <p:sp>
+        <p:nvSpPr>
+          <p:cNvPr id="31" name="TextBox 30">
+            <a:extLst>
+              <a:ext uri="{FF2B5EF4-FFF2-40B4-BE49-F238E27FC236}">
+                <a16:creationId xmlns:a16="http://schemas.microsoft.com/office/drawing/2014/main" id="{DE0EAED1-B394-49EE-A179-3895C0BCFB6F}"/>
+              </a:ext>
+            </a:extLst>
+          </p:cNvPr>
+          <p:cNvSpPr txBox="1"/>
+          <p:nvPr/>
+        </p:nvSpPr>
+        <p:spPr>
+          <a:xfrm>
+            <a:off x="198685" y="4974776"/>
+            <a:ext cx="1459332" cy="307777"/>
+          </a:xfrm>
+          <a:prstGeom prst="rect">
+            <a:avLst/>
+          </a:prstGeom>
+          <a:noFill/>
+        </p:spPr>
+        <p:txBody>
+          <a:bodyPr wrap="square" rtlCol="0">
+            <a:spAutoFit/>
+          </a:bodyPr>
+          <a:lstStyle/>
+          <a:p>
+            <a:r>
+              <a:rPr lang="en-SG" sz="1400" dirty="0">
+                <a:solidFill>
+                  <a:srgbClr val="FF0000"/>
+                </a:solidFill>
+                <a:latin typeface="Times New Roman" panose="02020603050405020304" pitchFamily="18" charset="0"/>
+                <a:cs typeface="Times New Roman" panose="02020603050405020304" pitchFamily="18" charset="0"/>
+              </a:rPr>
+              <a:t>If check failed</a:t>
+            </a:r>
+          </a:p>
+        </p:txBody>
+      </p:sp>
+      <p:sp>
+        <p:nvSpPr>
+          <p:cNvPr id="34" name="TextBox 33">
+            <a:extLst>
+              <a:ext uri="{FF2B5EF4-FFF2-40B4-BE49-F238E27FC236}">
+                <a16:creationId xmlns:a16="http://schemas.microsoft.com/office/drawing/2014/main" id="{B085F0A1-1058-4A9A-9B4E-23BA2392F05A}"/>
+              </a:ext>
+            </a:extLst>
+          </p:cNvPr>
+          <p:cNvSpPr txBox="1"/>
+          <p:nvPr/>
+        </p:nvSpPr>
+        <p:spPr>
+          <a:xfrm>
+            <a:off x="-107259" y="5630036"/>
+            <a:ext cx="1765276" cy="307777"/>
+          </a:xfrm>
+          <a:prstGeom prst="rect">
+            <a:avLst/>
+          </a:prstGeom>
+          <a:noFill/>
+        </p:spPr>
+        <p:txBody>
+          <a:bodyPr wrap="square" rtlCol="0">
+            <a:spAutoFit/>
+          </a:bodyPr>
+          <a:lstStyle/>
+          <a:p>
+            <a:r>
+              <a:rPr lang="en-SG" sz="1400" dirty="0">
+                <a:solidFill>
+                  <a:srgbClr val="FF0000"/>
+                </a:solidFill>
+                <a:latin typeface="Times New Roman" panose="02020603050405020304" pitchFamily="18" charset="0"/>
+                <a:cs typeface="Times New Roman" panose="02020603050405020304" pitchFamily="18" charset="0"/>
+              </a:rPr>
+              <a:t>If check succeeded</a:t>
+            </a:r>
+          </a:p>
+        </p:txBody>
+      </p:sp>
+      <p:cxnSp>
+        <p:nvCxnSpPr>
+          <p:cNvPr id="35" name="Straight Arrow Connector 34">
+            <a:extLst>
+              <a:ext uri="{FF2B5EF4-FFF2-40B4-BE49-F238E27FC236}">
+                <a16:creationId xmlns:a16="http://schemas.microsoft.com/office/drawing/2014/main" id="{89EAA38D-6AF6-4113-80F0-DDDF85D43083}"/>
+              </a:ext>
+            </a:extLst>
+          </p:cNvPr>
+          <p:cNvCxnSpPr/>
+          <p:nvPr/>
+        </p:nvCxnSpPr>
+        <p:spPr>
+          <a:xfrm>
+            <a:off x="1509813" y="5109623"/>
+            <a:ext cx="3893293" cy="381000"/>
+          </a:xfrm>
+          <a:prstGeom prst="straightConnector1">
+            <a:avLst/>
+          </a:prstGeom>
+          <a:ln w="12700">
+            <a:headEnd type="none" w="med" len="med"/>
+            <a:tailEnd type="arrow" w="med" len="med"/>
+          </a:ln>
+        </p:spPr>
+        <p:style>
+          <a:lnRef idx="1">
+            <a:schemeClr val="dk1"/>
+          </a:lnRef>
+          <a:fillRef idx="0">
+            <a:schemeClr val="dk1"/>
+          </a:fillRef>
+          <a:effectRef idx="0">
+            <a:schemeClr val="dk1"/>
+          </a:effectRef>
+          <a:fontRef idx="minor">
+            <a:schemeClr val="tx1"/>
+          </a:fontRef>
+        </p:style>
+      </p:cxnSp>
+      <p:sp>
+        <p:nvSpPr>
+          <p:cNvPr id="36" name="TextBox 35">
+            <a:extLst>
+              <a:ext uri="{FF2B5EF4-FFF2-40B4-BE49-F238E27FC236}">
+                <a16:creationId xmlns:a16="http://schemas.microsoft.com/office/drawing/2014/main" id="{8D62A91C-F208-446E-B1C1-F9EF276875C0}"/>
+              </a:ext>
+            </a:extLst>
+          </p:cNvPr>
+          <p:cNvSpPr txBox="1"/>
+          <p:nvPr/>
+        </p:nvSpPr>
+        <p:spPr>
+          <a:xfrm rot="324564">
+            <a:off x="3103367" y="5011711"/>
+            <a:ext cx="635110" cy="307777"/>
+          </a:xfrm>
+          <a:prstGeom prst="rect">
+            <a:avLst/>
+          </a:prstGeom>
+          <a:noFill/>
+        </p:spPr>
+        <p:txBody>
+          <a:bodyPr wrap="none" rtlCol="0">
+            <a:spAutoFit/>
+          </a:bodyPr>
+          <a:lstStyle/>
+          <a:p>
+            <a:r>
+              <a:rPr lang="en-SG" sz="1400" dirty="0">
+                <a:latin typeface="Times New Roman" panose="02020603050405020304" pitchFamily="18" charset="0"/>
+                <a:cs typeface="Times New Roman" panose="02020603050405020304" pitchFamily="18" charset="0"/>
+              </a:rPr>
+              <a:t>“Bye”</a:t>
+            </a:r>
+          </a:p>
+        </p:txBody>
+      </p:sp>
+      <p:cxnSp>
+        <p:nvCxnSpPr>
+          <p:cNvPr id="37" name="Straight Arrow Connector 36">
+            <a:extLst>
+              <a:ext uri="{FF2B5EF4-FFF2-40B4-BE49-F238E27FC236}">
+                <a16:creationId xmlns:a16="http://schemas.microsoft.com/office/drawing/2014/main" id="{5D2B00C4-393C-4E43-8655-E4DAABE2AFF8}"/>
+              </a:ext>
+            </a:extLst>
+          </p:cNvPr>
+          <p:cNvCxnSpPr/>
+          <p:nvPr/>
+        </p:nvCxnSpPr>
+        <p:spPr>
+          <a:xfrm>
+            <a:off x="1499413" y="5845236"/>
+            <a:ext cx="3893293" cy="381000"/>
+          </a:xfrm>
+          <a:prstGeom prst="straightConnector1">
+            <a:avLst/>
+          </a:prstGeom>
+          <a:ln w="12700">
+            <a:headEnd type="none" w="med" len="med"/>
+            <a:tailEnd type="arrow" w="med" len="med"/>
+          </a:ln>
+        </p:spPr>
+        <p:style>
+          <a:lnRef idx="1">
+            <a:schemeClr val="dk1"/>
+          </a:lnRef>
+          <a:fillRef idx="0">
+            <a:schemeClr val="dk1"/>
+          </a:fillRef>
+          <a:effectRef idx="0">
+            <a:schemeClr val="dk1"/>
+          </a:effectRef>
+          <a:fontRef idx="minor">
+            <a:schemeClr val="tx1"/>
+          </a:fontRef>
+        </p:style>
+      </p:cxnSp>
+      <mc:AlternateContent xmlns:mc="http://schemas.openxmlformats.org/markup-compatibility/2006">
+        <mc:Choice xmlns:a14="http://schemas.microsoft.com/office/drawing/2010/main" Requires="a14">
+          <p:sp>
+            <p:nvSpPr>
+              <p:cNvPr id="38" name="TextBox 37">
+                <a:extLst>
+                  <a:ext uri="{FF2B5EF4-FFF2-40B4-BE49-F238E27FC236}">
+                    <a16:creationId xmlns:a16="http://schemas.microsoft.com/office/drawing/2014/main" id="{BFC6E34E-2962-4BD6-80D0-6EC476F51263}"/>
+                  </a:ext>
+                </a:extLst>
+              </p:cNvPr>
+              <p:cNvSpPr txBox="1"/>
+              <p:nvPr/>
+            </p:nvSpPr>
+            <p:spPr>
+              <a:xfrm rot="324564">
+                <a:off x="2669265" y="5747324"/>
+                <a:ext cx="1482522" cy="307777"/>
+              </a:xfrm>
+              <a:prstGeom prst="rect">
+                <a:avLst/>
+              </a:prstGeom>
+              <a:noFill/>
+            </p:spPr>
+            <p:txBody>
+              <a:bodyPr wrap="none" rtlCol="0">
+                <a:spAutoFit/>
+              </a:bodyPr>
+              <a:lstStyle/>
+              <a:p>
+                <a14:m>
+                  <m:oMath xmlns:m="http://schemas.openxmlformats.org/officeDocument/2006/math">
+                    <m:sSubSup>
+                      <m:sSubSupPr>
+                        <m:ctrlPr>
+                          <a:rPr lang="en-SG" sz="1400" b="1" i="1">
+                            <a:latin typeface="Cambria Math" panose="02040503050406030204" pitchFamily="18" charset="0"/>
+                            <a:cs typeface="Times New Roman" panose="02020603050405020304" pitchFamily="18" charset="0"/>
+                          </a:rPr>
+                        </m:ctrlPr>
+                      </m:sSubSupPr>
+                      <m:e>
+                        <m:r>
+                          <a:rPr lang="en-SG" sz="1400" b="1" i="1">
+                            <a:latin typeface="Cambria Math" panose="02040503050406030204" pitchFamily="18" charset="0"/>
+                            <a:cs typeface="Times New Roman" panose="02020603050405020304" pitchFamily="18" charset="0"/>
+                          </a:rPr>
+                          <m:t>𝑲</m:t>
+                        </m:r>
+                      </m:e>
+                      <m:sub>
+                        <m:r>
+                          <a:rPr lang="en-SG" sz="1400" b="1" i="1">
+                            <a:latin typeface="Cambria Math" panose="02040503050406030204" pitchFamily="18" charset="0"/>
+                            <a:cs typeface="Times New Roman" panose="02020603050405020304" pitchFamily="18" charset="0"/>
+                          </a:rPr>
+                          <m:t>𝒔</m:t>
+                        </m:r>
+                      </m:sub>
+                      <m:sup>
+                        <m:r>
+                          <a:rPr lang="en-SG" sz="1400" b="1" i="1">
+                            <a:latin typeface="Cambria Math" panose="02040503050406030204" pitchFamily="18" charset="0"/>
+                            <a:cs typeface="Times New Roman" panose="02020603050405020304" pitchFamily="18" charset="0"/>
+                          </a:rPr>
+                          <m:t>+</m:t>
+                        </m:r>
+                      </m:sup>
+                    </m:sSubSup>
+                  </m:oMath>
+                </a14:m>
+                <a:r>
+                  <a:rPr lang="en-SG" sz="1400" dirty="0">
+                    <a:latin typeface="Times New Roman" panose="02020603050405020304" pitchFamily="18" charset="0"/>
+                    <a:cs typeface="Times New Roman" panose="02020603050405020304" pitchFamily="18" charset="0"/>
+                  </a:rPr>
+                  <a:t> (Session Key)</a:t>
+                </a:r>
+              </a:p>
+            </p:txBody>
+          </p:sp>
+        </mc:Choice>
+        <mc:Fallback>
+          <p:sp>
+            <p:nvSpPr>
+              <p:cNvPr id="38" name="TextBox 37">
+                <a:extLst>
+                  <a:ext uri="{FF2B5EF4-FFF2-40B4-BE49-F238E27FC236}">
+                    <a16:creationId xmlns:a16="http://schemas.microsoft.com/office/drawing/2014/main" id="{BFC6E34E-2962-4BD6-80D0-6EC476F51263}"/>
+                  </a:ext>
+                </a:extLst>
+              </p:cNvPr>
+              <p:cNvSpPr txBox="1">
+                <a:spLocks noRot="1" noChangeAspect="1" noMove="1" noResize="1" noEditPoints="1" noAdjustHandles="1" noChangeArrowheads="1" noChangeShapeType="1" noTextEdit="1"/>
+              </p:cNvSpPr>
+              <p:nvPr/>
+            </p:nvSpPr>
+            <p:spPr>
+              <a:xfrm rot="324564">
+                <a:off x="2669265" y="5747324"/>
+                <a:ext cx="1482522" cy="307777"/>
+              </a:xfrm>
+              <a:prstGeom prst="rect">
+                <a:avLst/>
+              </a:prstGeom>
+              <a:blipFill>
+                <a:blip r:embed="rId7"/>
+                <a:stretch>
+                  <a:fillRect b="-12162"/>
+                </a:stretch>
+              </a:blipFill>
+            </p:spPr>
+            <p:txBody>
+              <a:bodyPr/>
+              <a:lstStyle/>
+              <a:p>
+                <a:r>
+                  <a:rPr lang="en-SG">
+                    <a:noFill/>
+                  </a:rPr>
+                  <a:t> </a:t>
+                </a:r>
+              </a:p>
+            </p:txBody>
+          </p:sp>
+        </mc:Fallback>
+      </mc:AlternateContent>
+      <p:cxnSp>
+        <p:nvCxnSpPr>
+          <p:cNvPr id="33" name="Straight Arrow Connector 32">
+            <a:extLst>
+              <a:ext uri="{FF2B5EF4-FFF2-40B4-BE49-F238E27FC236}">
+                <a16:creationId xmlns:a16="http://schemas.microsoft.com/office/drawing/2014/main" id="{198EE21C-BAEE-4928-BA51-18007E58CFB4}"/>
+              </a:ext>
+            </a:extLst>
+          </p:cNvPr>
+          <p:cNvCxnSpPr/>
+          <p:nvPr/>
+        </p:nvCxnSpPr>
+        <p:spPr>
+          <a:xfrm>
+            <a:off x="1499412" y="6769796"/>
+            <a:ext cx="3893293" cy="381000"/>
+          </a:xfrm>
+          <a:prstGeom prst="straightConnector1">
+            <a:avLst/>
+          </a:prstGeom>
+          <a:ln w="12700">
+            <a:headEnd type="none" w="med" len="med"/>
+            <a:tailEnd type="arrow" w="med" len="med"/>
+          </a:ln>
+        </p:spPr>
+        <p:style>
+          <a:lnRef idx="1">
+            <a:schemeClr val="dk1"/>
+          </a:lnRef>
+          <a:fillRef idx="0">
+            <a:schemeClr val="dk1"/>
+          </a:fillRef>
+          <a:effectRef idx="0">
+            <a:schemeClr val="dk1"/>
+          </a:effectRef>
+          <a:fontRef idx="minor">
+            <a:schemeClr val="tx1"/>
+          </a:fontRef>
+        </p:style>
+      </p:cxnSp>
+      <mc:AlternateContent xmlns:mc="http://schemas.openxmlformats.org/markup-compatibility/2006">
+        <mc:Choice xmlns:a14="http://schemas.microsoft.com/office/drawing/2010/main" Requires="a14">
+          <p:sp>
+            <p:nvSpPr>
+              <p:cNvPr id="39" name="TextBox 38">
+                <a:extLst>
+                  <a:ext uri="{FF2B5EF4-FFF2-40B4-BE49-F238E27FC236}">
+                    <a16:creationId xmlns:a16="http://schemas.microsoft.com/office/drawing/2014/main" id="{1CBD10EB-5134-4854-93E5-6D2889ED3B46}"/>
+                  </a:ext>
+                </a:extLst>
+              </p:cNvPr>
+              <p:cNvSpPr txBox="1"/>
+              <p:nvPr/>
+            </p:nvSpPr>
+            <p:spPr>
+              <a:xfrm rot="324564">
+                <a:off x="2714950" y="6671884"/>
+                <a:ext cx="1391150" cy="307777"/>
+              </a:xfrm>
+              <a:prstGeom prst="rect">
+                <a:avLst/>
+              </a:prstGeom>
+              <a:noFill/>
+            </p:spPr>
+            <p:txBody>
+              <a:bodyPr wrap="none" rtlCol="0">
+                <a:spAutoFit/>
+              </a:bodyPr>
+              <a:lstStyle/>
+              <a:p>
+                <a14:m>
+                  <m:oMath xmlns:m="http://schemas.openxmlformats.org/officeDocument/2006/math">
+                    <m:sSub>
+                      <m:sSubPr>
+                        <m:ctrlPr>
+                          <a:rPr lang="en-SG" sz="1400" b="1" i="1">
+                            <a:latin typeface="Cambria Math" panose="02040503050406030204" pitchFamily="18" charset="0"/>
+                            <a:cs typeface="Times New Roman" panose="02020603050405020304" pitchFamily="18" charset="0"/>
+                          </a:rPr>
+                        </m:ctrlPr>
+                      </m:sSubPr>
+                      <m:e>
+                        <m:r>
+                          <a:rPr lang="en-SG" sz="1400" b="1" i="1">
+                            <a:latin typeface="Cambria Math" panose="02040503050406030204" pitchFamily="18" charset="0"/>
+                            <a:cs typeface="Times New Roman" panose="02020603050405020304" pitchFamily="18" charset="0"/>
+                          </a:rPr>
+                          <m:t>𝑲</m:t>
+                        </m:r>
+                      </m:e>
+                      <m:sub>
+                        <m:r>
+                          <a:rPr lang="en-SG" sz="1400" b="1" i="1">
+                            <a:latin typeface="Cambria Math" panose="02040503050406030204" pitchFamily="18" charset="0"/>
+                            <a:cs typeface="Times New Roman" panose="02020603050405020304" pitchFamily="18" charset="0"/>
+                          </a:rPr>
+                          <m:t>𝒔𝒆𝒔𝒔</m:t>
+                        </m:r>
+                      </m:sub>
+                    </m:sSub>
+                  </m:oMath>
+                </a14:m>
+                <a:r>
+                  <a:rPr lang="en-SG" sz="1400" dirty="0">
+                    <a:latin typeface="Times New Roman" panose="02020603050405020304" pitchFamily="18" charset="0"/>
+                    <a:cs typeface="Times New Roman" panose="02020603050405020304" pitchFamily="18" charset="0"/>
+                  </a:rPr>
+                  <a:t>(file name)</a:t>
+                </a:r>
+              </a:p>
+            </p:txBody>
+          </p:sp>
+        </mc:Choice>
+        <mc:Fallback>
+          <p:sp>
+            <p:nvSpPr>
+              <p:cNvPr id="39" name="TextBox 38">
+                <a:extLst>
+                  <a:ext uri="{FF2B5EF4-FFF2-40B4-BE49-F238E27FC236}">
+                    <a16:creationId xmlns:a16="http://schemas.microsoft.com/office/drawing/2014/main" id="{1CBD10EB-5134-4854-93E5-6D2889ED3B46}"/>
+                  </a:ext>
+                </a:extLst>
+              </p:cNvPr>
+              <p:cNvSpPr txBox="1">
+                <a:spLocks noRot="1" noChangeAspect="1" noMove="1" noResize="1" noEditPoints="1" noAdjustHandles="1" noChangeArrowheads="1" noChangeShapeType="1" noTextEdit="1"/>
+              </p:cNvSpPr>
+              <p:nvPr/>
+            </p:nvSpPr>
+            <p:spPr>
+              <a:xfrm rot="324564">
+                <a:off x="2714950" y="6671884"/>
+                <a:ext cx="1391150" cy="307777"/>
+              </a:xfrm>
+              <a:prstGeom prst="rect">
+                <a:avLst/>
+              </a:prstGeom>
+              <a:blipFill>
+                <a:blip r:embed="rId8"/>
+                <a:stretch>
+                  <a:fillRect b="-12329"/>
+                </a:stretch>
+              </a:blipFill>
+            </p:spPr>
+            <p:txBody>
+              <a:bodyPr/>
+              <a:lstStyle/>
+              <a:p>
+                <a:r>
+                  <a:rPr lang="en-SG">
+                    <a:noFill/>
+                  </a:rPr>
+                  <a:t> </a:t>
+                </a:r>
+              </a:p>
+            </p:txBody>
+          </p:sp>
+        </mc:Fallback>
+      </mc:AlternateContent>
+      <p:cxnSp>
+        <p:nvCxnSpPr>
+          <p:cNvPr id="40" name="Straight Arrow Connector 39">
+            <a:extLst>
+              <a:ext uri="{FF2B5EF4-FFF2-40B4-BE49-F238E27FC236}">
+                <a16:creationId xmlns:a16="http://schemas.microsoft.com/office/drawing/2014/main" id="{308597D9-6770-4741-AFD6-C05F7ACC0AAA}"/>
+              </a:ext>
+            </a:extLst>
+          </p:cNvPr>
+          <p:cNvCxnSpPr/>
+          <p:nvPr/>
+        </p:nvCxnSpPr>
+        <p:spPr>
+          <a:xfrm>
+            <a:off x="1499412" y="7280544"/>
+            <a:ext cx="3893293" cy="381000"/>
+          </a:xfrm>
+          <a:prstGeom prst="straightConnector1">
+            <a:avLst/>
+          </a:prstGeom>
+          <a:ln w="12700">
+            <a:headEnd type="none" w="med" len="med"/>
+            <a:tailEnd type="arrow" w="med" len="med"/>
+          </a:ln>
+        </p:spPr>
+        <p:style>
+          <a:lnRef idx="1">
+            <a:schemeClr val="dk1"/>
+          </a:lnRef>
+          <a:fillRef idx="0">
+            <a:schemeClr val="dk1"/>
+          </a:fillRef>
+          <a:effectRef idx="0">
+            <a:schemeClr val="dk1"/>
+          </a:effectRef>
+          <a:fontRef idx="minor">
+            <a:schemeClr val="tx1"/>
+          </a:fontRef>
+        </p:style>
+      </p:cxnSp>
+      <mc:AlternateContent xmlns:mc="http://schemas.openxmlformats.org/markup-compatibility/2006">
+        <mc:Choice xmlns:a14="http://schemas.microsoft.com/office/drawing/2010/main" Requires="a14">
+          <p:sp>
+            <p:nvSpPr>
+              <p:cNvPr id="41" name="TextBox 40">
+                <a:extLst>
+                  <a:ext uri="{FF2B5EF4-FFF2-40B4-BE49-F238E27FC236}">
+                    <a16:creationId xmlns:a16="http://schemas.microsoft.com/office/drawing/2014/main" id="{2D09D614-821F-4D83-B27D-385E1B7A3281}"/>
+                  </a:ext>
+                </a:extLst>
+              </p:cNvPr>
+              <p:cNvSpPr txBox="1"/>
+              <p:nvPr/>
+            </p:nvSpPr>
+            <p:spPr>
+              <a:xfrm rot="324564">
+                <a:off x="2642817" y="7182632"/>
+                <a:ext cx="1535420" cy="307777"/>
+              </a:xfrm>
+              <a:prstGeom prst="rect">
+                <a:avLst/>
+              </a:prstGeom>
+              <a:noFill/>
+            </p:spPr>
+            <p:txBody>
+              <a:bodyPr wrap="none" rtlCol="0">
+                <a:spAutoFit/>
+              </a:bodyPr>
+              <a:lstStyle/>
+              <a:p>
+                <a14:m>
+                  <m:oMath xmlns:m="http://schemas.openxmlformats.org/officeDocument/2006/math">
+                    <m:sSub>
+                      <m:sSubPr>
+                        <m:ctrlPr>
+                          <a:rPr lang="en-SG" sz="1400" b="1" i="1">
+                            <a:latin typeface="Cambria Math" panose="02040503050406030204" pitchFamily="18" charset="0"/>
+                            <a:cs typeface="Times New Roman" panose="02020603050405020304" pitchFamily="18" charset="0"/>
+                          </a:rPr>
+                        </m:ctrlPr>
+                      </m:sSubPr>
+                      <m:e>
+                        <m:r>
+                          <a:rPr lang="en-SG" sz="1400" b="1" i="1">
+                            <a:latin typeface="Cambria Math" panose="02040503050406030204" pitchFamily="18" charset="0"/>
+                            <a:cs typeface="Times New Roman" panose="02020603050405020304" pitchFamily="18" charset="0"/>
+                          </a:rPr>
+                          <m:t>𝑲</m:t>
+                        </m:r>
+                      </m:e>
+                      <m:sub>
+                        <m:r>
+                          <a:rPr lang="en-SG" sz="1400" b="1" i="1">
+                            <a:latin typeface="Cambria Math" panose="02040503050406030204" pitchFamily="18" charset="0"/>
+                            <a:cs typeface="Times New Roman" panose="02020603050405020304" pitchFamily="18" charset="0"/>
+                          </a:rPr>
+                          <m:t>𝒔𝒆𝒔𝒔</m:t>
+                        </m:r>
+                      </m:sub>
+                    </m:sSub>
+                  </m:oMath>
+                </a14:m>
+                <a:r>
+                  <a:rPr lang="en-SG" sz="1400" dirty="0">
+                    <a:latin typeface="Times New Roman" panose="02020603050405020304" pitchFamily="18" charset="0"/>
+                    <a:cs typeface="Times New Roman" panose="02020603050405020304" pitchFamily="18" charset="0"/>
+                  </a:rPr>
+                  <a:t>(file block 1)</a:t>
+                </a:r>
+              </a:p>
+            </p:txBody>
+          </p:sp>
+        </mc:Choice>
+        <mc:Fallback>
+          <p:sp>
+            <p:nvSpPr>
+              <p:cNvPr id="41" name="TextBox 40">
+                <a:extLst>
+                  <a:ext uri="{FF2B5EF4-FFF2-40B4-BE49-F238E27FC236}">
+                    <a16:creationId xmlns:a16="http://schemas.microsoft.com/office/drawing/2014/main" id="{2D09D614-821F-4D83-B27D-385E1B7A3281}"/>
+                  </a:ext>
+                </a:extLst>
+              </p:cNvPr>
+              <p:cNvSpPr txBox="1">
+                <a:spLocks noRot="1" noChangeAspect="1" noMove="1" noResize="1" noEditPoints="1" noAdjustHandles="1" noChangeArrowheads="1" noChangeShapeType="1" noTextEdit="1"/>
+              </p:cNvSpPr>
+              <p:nvPr/>
+            </p:nvSpPr>
+            <p:spPr>
+              <a:xfrm rot="324564">
+                <a:off x="2642817" y="7182632"/>
+                <a:ext cx="1535420" cy="307777"/>
+              </a:xfrm>
+              <a:prstGeom prst="rect">
+                <a:avLst/>
+              </a:prstGeom>
+              <a:blipFill>
+                <a:blip r:embed="rId9"/>
+                <a:stretch>
+                  <a:fillRect b="-12000"/>
+                </a:stretch>
+              </a:blipFill>
+            </p:spPr>
+            <p:txBody>
+              <a:bodyPr/>
+              <a:lstStyle/>
+              <a:p>
+                <a:r>
+                  <a:rPr lang="en-SG">
+                    <a:noFill/>
+                  </a:rPr>
+                  <a:t> </a:t>
+                </a:r>
+              </a:p>
+            </p:txBody>
+          </p:sp>
+        </mc:Fallback>
+      </mc:AlternateContent>
+      <p:cxnSp>
+        <p:nvCxnSpPr>
+          <p:cNvPr id="42" name="Straight Arrow Connector 41">
+            <a:extLst>
+              <a:ext uri="{FF2B5EF4-FFF2-40B4-BE49-F238E27FC236}">
+                <a16:creationId xmlns:a16="http://schemas.microsoft.com/office/drawing/2014/main" id="{704285AC-BD24-4BE4-909C-DAB07AA9C0FF}"/>
+              </a:ext>
+            </a:extLst>
+          </p:cNvPr>
+          <p:cNvCxnSpPr/>
+          <p:nvPr/>
+        </p:nvCxnSpPr>
+        <p:spPr>
+          <a:xfrm>
+            <a:off x="1499413" y="8053511"/>
+            <a:ext cx="3893293" cy="381000"/>
+          </a:xfrm>
+          <a:prstGeom prst="straightConnector1">
+            <a:avLst/>
+          </a:prstGeom>
+          <a:ln w="12700">
+            <a:headEnd type="none" w="med" len="med"/>
+            <a:tailEnd type="arrow" w="med" len="med"/>
+          </a:ln>
+        </p:spPr>
+        <p:style>
+          <a:lnRef idx="1">
+            <a:schemeClr val="dk1"/>
+          </a:lnRef>
+          <a:fillRef idx="0">
+            <a:schemeClr val="dk1"/>
+          </a:fillRef>
+          <a:effectRef idx="0">
+            <a:schemeClr val="dk1"/>
+          </a:effectRef>
+          <a:fontRef idx="minor">
+            <a:schemeClr val="tx1"/>
+          </a:fontRef>
+        </p:style>
+      </p:cxnSp>
+      <mc:AlternateContent xmlns:mc="http://schemas.openxmlformats.org/markup-compatibility/2006">
+        <mc:Choice xmlns:a14="http://schemas.microsoft.com/office/drawing/2010/main" Requires="a14">
+          <p:sp>
+            <p:nvSpPr>
+              <p:cNvPr id="43" name="TextBox 42">
+                <a:extLst>
+                  <a:ext uri="{FF2B5EF4-FFF2-40B4-BE49-F238E27FC236}">
+                    <a16:creationId xmlns:a16="http://schemas.microsoft.com/office/drawing/2014/main" id="{3D8500EF-889F-4DB3-A3D9-14E32EA04868}"/>
+                  </a:ext>
+                </a:extLst>
+              </p:cNvPr>
+              <p:cNvSpPr txBox="1"/>
+              <p:nvPr/>
+            </p:nvSpPr>
+            <p:spPr>
+              <a:xfrm rot="324564">
+                <a:off x="2642818" y="7955599"/>
+                <a:ext cx="1535420" cy="307777"/>
+              </a:xfrm>
+              <a:prstGeom prst="rect">
+                <a:avLst/>
+              </a:prstGeom>
+              <a:noFill/>
+            </p:spPr>
+            <p:txBody>
+              <a:bodyPr wrap="none" rtlCol="0">
+                <a:spAutoFit/>
+              </a:bodyPr>
+              <a:lstStyle/>
+              <a:p>
+                <a14:m>
+                  <m:oMath xmlns:m="http://schemas.openxmlformats.org/officeDocument/2006/math">
+                    <m:sSub>
+                      <m:sSubPr>
+                        <m:ctrlPr>
+                          <a:rPr lang="en-SG" sz="1400" b="1" i="1">
+                            <a:latin typeface="Cambria Math" panose="02040503050406030204" pitchFamily="18" charset="0"/>
+                            <a:cs typeface="Times New Roman" panose="02020603050405020304" pitchFamily="18" charset="0"/>
+                          </a:rPr>
+                        </m:ctrlPr>
+                      </m:sSubPr>
+                      <m:e>
+                        <m:r>
+                          <a:rPr lang="en-SG" sz="1400" b="1" i="1">
+                            <a:latin typeface="Cambria Math" panose="02040503050406030204" pitchFamily="18" charset="0"/>
+                            <a:cs typeface="Times New Roman" panose="02020603050405020304" pitchFamily="18" charset="0"/>
+                          </a:rPr>
+                          <m:t>𝑲</m:t>
+                        </m:r>
+                      </m:e>
+                      <m:sub>
+                        <m:r>
+                          <a:rPr lang="en-SG" sz="1400" b="1" i="1">
+                            <a:latin typeface="Cambria Math" panose="02040503050406030204" pitchFamily="18" charset="0"/>
+                            <a:cs typeface="Times New Roman" panose="02020603050405020304" pitchFamily="18" charset="0"/>
+                          </a:rPr>
+                          <m:t>𝒔𝒆𝒔𝒔</m:t>
+                        </m:r>
+                      </m:sub>
+                    </m:sSub>
+                  </m:oMath>
+                </a14:m>
+                <a:r>
+                  <a:rPr lang="en-SG" sz="1400" dirty="0">
+                    <a:latin typeface="Times New Roman" panose="02020603050405020304" pitchFamily="18" charset="0"/>
+                    <a:cs typeface="Times New Roman" panose="02020603050405020304" pitchFamily="18" charset="0"/>
+                  </a:rPr>
+                  <a:t>(file block n)</a:t>
+                </a:r>
+              </a:p>
+            </p:txBody>
+          </p:sp>
+        </mc:Choice>
+        <mc:Fallback>
+          <p:sp>
+            <p:nvSpPr>
+              <p:cNvPr id="43" name="TextBox 42">
+                <a:extLst>
+                  <a:ext uri="{FF2B5EF4-FFF2-40B4-BE49-F238E27FC236}">
+                    <a16:creationId xmlns:a16="http://schemas.microsoft.com/office/drawing/2014/main" id="{3D8500EF-889F-4DB3-A3D9-14E32EA04868}"/>
+                  </a:ext>
+                </a:extLst>
+              </p:cNvPr>
+              <p:cNvSpPr txBox="1">
+                <a:spLocks noRot="1" noChangeAspect="1" noMove="1" noResize="1" noEditPoints="1" noAdjustHandles="1" noChangeArrowheads="1" noChangeShapeType="1" noTextEdit="1"/>
+              </p:cNvSpPr>
+              <p:nvPr/>
+            </p:nvSpPr>
+            <p:spPr>
+              <a:xfrm rot="324564">
+                <a:off x="2642818" y="7955599"/>
+                <a:ext cx="1535420" cy="307777"/>
+              </a:xfrm>
+              <a:prstGeom prst="rect">
+                <a:avLst/>
+              </a:prstGeom>
+              <a:blipFill>
+                <a:blip r:embed="rId10"/>
+                <a:stretch>
+                  <a:fillRect b="-12000"/>
+                </a:stretch>
+              </a:blipFill>
+            </p:spPr>
+            <p:txBody>
+              <a:bodyPr/>
+              <a:lstStyle/>
+              <a:p>
+                <a:r>
+                  <a:rPr lang="en-SG">
+                    <a:noFill/>
+                  </a:rPr>
+                  <a:t> </a:t>
+                </a:r>
+              </a:p>
+            </p:txBody>
+          </p:sp>
+        </mc:Fallback>
+      </mc:AlternateContent>
+      <p:sp>
+        <p:nvSpPr>
+          <p:cNvPr id="44" name="TextBox 43">
+            <a:extLst>
+              <a:ext uri="{FF2B5EF4-FFF2-40B4-BE49-F238E27FC236}">
+                <a16:creationId xmlns:a16="http://schemas.microsoft.com/office/drawing/2014/main" id="{DD0E0920-389C-4670-A404-13E8E59C9175}"/>
+              </a:ext>
+            </a:extLst>
+          </p:cNvPr>
+          <p:cNvSpPr txBox="1"/>
+          <p:nvPr/>
+        </p:nvSpPr>
+        <p:spPr>
+          <a:xfrm>
+            <a:off x="3300558" y="7409112"/>
+            <a:ext cx="219932" cy="600164"/>
+          </a:xfrm>
+          <a:prstGeom prst="rect">
+            <a:avLst/>
+          </a:prstGeom>
+          <a:noFill/>
+        </p:spPr>
+        <p:txBody>
+          <a:bodyPr wrap="none" rtlCol="0">
+            <a:spAutoFit/>
+          </a:bodyPr>
+          <a:lstStyle/>
+          <a:p>
+            <a:r>
+              <a:rPr lang="en-SG" sz="1100" b="1" dirty="0">
+                <a:latin typeface="Times New Roman" panose="02020603050405020304" pitchFamily="18" charset="0"/>
+                <a:cs typeface="Times New Roman" panose="02020603050405020304" pitchFamily="18" charset="0"/>
+              </a:rPr>
+              <a:t>.</a:t>
+            </a:r>
+          </a:p>
+          <a:p>
+            <a:r>
+              <a:rPr lang="en-SG" sz="1100" b="1" dirty="0">
+                <a:latin typeface="Times New Roman" panose="02020603050405020304" pitchFamily="18" charset="0"/>
+                <a:cs typeface="Times New Roman" panose="02020603050405020304" pitchFamily="18" charset="0"/>
+              </a:rPr>
+              <a:t>.</a:t>
+            </a:r>
+          </a:p>
+          <a:p>
+            <a:r>
+              <a:rPr lang="en-SG" sz="1100" b="1" dirty="0">
+                <a:latin typeface="Times New Roman" panose="02020603050405020304" pitchFamily="18" charset="0"/>
+                <a:cs typeface="Times New Roman" panose="02020603050405020304" pitchFamily="18" charset="0"/>
+              </a:rPr>
+              <a:t>.</a:t>
+            </a:r>
+          </a:p>
+        </p:txBody>
+      </p:sp>
+      <p:cxnSp>
+        <p:nvCxnSpPr>
+          <p:cNvPr id="45" name="Straight Arrow Connector 44">
+            <a:extLst>
+              <a:ext uri="{FF2B5EF4-FFF2-40B4-BE49-F238E27FC236}">
+                <a16:creationId xmlns:a16="http://schemas.microsoft.com/office/drawing/2014/main" id="{134DFE8F-6C0D-4721-9F85-B11B37392658}"/>
+              </a:ext>
+            </a:extLst>
+          </p:cNvPr>
+          <p:cNvCxnSpPr/>
+          <p:nvPr/>
+        </p:nvCxnSpPr>
+        <p:spPr>
+          <a:xfrm>
+            <a:off x="1512214" y="9123762"/>
+            <a:ext cx="3893293" cy="381000"/>
+          </a:xfrm>
+          <a:prstGeom prst="straightConnector1">
+            <a:avLst/>
+          </a:prstGeom>
+          <a:ln w="12700">
+            <a:headEnd type="none" w="med" len="med"/>
+            <a:tailEnd type="arrow" w="med" len="med"/>
+          </a:ln>
+        </p:spPr>
+        <p:style>
+          <a:lnRef idx="1">
+            <a:schemeClr val="dk1"/>
+          </a:lnRef>
+          <a:fillRef idx="0">
+            <a:schemeClr val="dk1"/>
+          </a:fillRef>
+          <a:effectRef idx="0">
+            <a:schemeClr val="dk1"/>
+          </a:effectRef>
+          <a:fontRef idx="minor">
+            <a:schemeClr val="tx1"/>
+          </a:fontRef>
+        </p:style>
+      </p:cxnSp>
+      <p:sp>
+        <p:nvSpPr>
+          <p:cNvPr id="46" name="TextBox 45">
+            <a:extLst>
+              <a:ext uri="{FF2B5EF4-FFF2-40B4-BE49-F238E27FC236}">
+                <a16:creationId xmlns:a16="http://schemas.microsoft.com/office/drawing/2014/main" id="{2EFA03E7-577E-45D9-A627-22EE7DDD945A}"/>
+              </a:ext>
+            </a:extLst>
+          </p:cNvPr>
+          <p:cNvSpPr txBox="1"/>
+          <p:nvPr/>
+        </p:nvSpPr>
+        <p:spPr>
+          <a:xfrm rot="324564">
+            <a:off x="2709033" y="9025850"/>
+            <a:ext cx="1428596" cy="307777"/>
+          </a:xfrm>
+          <a:prstGeom prst="rect">
+            <a:avLst/>
+          </a:prstGeom>
+          <a:noFill/>
+        </p:spPr>
+        <p:txBody>
+          <a:bodyPr wrap="none" rtlCol="0">
+            <a:spAutoFit/>
+          </a:bodyPr>
+          <a:lstStyle/>
+          <a:p>
+            <a:r>
+              <a:rPr lang="en-SG" sz="1400" dirty="0">
+                <a:latin typeface="Times New Roman" panose="02020603050405020304" pitchFamily="18" charset="0"/>
+                <a:cs typeface="Times New Roman" panose="02020603050405020304" pitchFamily="18" charset="0"/>
+              </a:rPr>
+              <a:t>Close connection</a:t>
+            </a:r>
+          </a:p>
+        </p:txBody>
+      </p:sp>
+      <mc:AlternateContent xmlns:mc="http://schemas.openxmlformats.org/markup-compatibility/2006">
+        <mc:Choice xmlns:a14="http://schemas.microsoft.com/office/drawing/2010/main" Requires="a14">
+          <p:sp>
+            <p:nvSpPr>
+              <p:cNvPr id="47" name="TextBox 46">
+                <a:extLst>
+                  <a:ext uri="{FF2B5EF4-FFF2-40B4-BE49-F238E27FC236}">
+                    <a16:creationId xmlns:a16="http://schemas.microsoft.com/office/drawing/2014/main" id="{BD3906B7-D81D-4CAA-BE6B-148421D6B084}"/>
+                  </a:ext>
+                </a:extLst>
+              </p:cNvPr>
+              <p:cNvSpPr txBox="1"/>
+              <p:nvPr/>
+            </p:nvSpPr>
+            <p:spPr>
+              <a:xfrm>
+                <a:off x="5526370" y="7622301"/>
+                <a:ext cx="1809096" cy="523220"/>
+              </a:xfrm>
+              <a:prstGeom prst="rect">
+                <a:avLst/>
+              </a:prstGeom>
+              <a:noFill/>
+              <a:ln>
+                <a:solidFill>
+                  <a:schemeClr val="tx1"/>
+                </a:solidFill>
+              </a:ln>
+            </p:spPr>
+            <p:txBody>
+              <a:bodyPr wrap="square" rtlCol="0">
+                <a:spAutoFit/>
+              </a:bodyPr>
+              <a:lstStyle/>
+              <a:p>
+                <a:r>
+                  <a:rPr lang="en-SG" sz="1400" dirty="0">
+                    <a:latin typeface="Times New Roman" panose="02020603050405020304" pitchFamily="18" charset="0"/>
+                    <a:cs typeface="Times New Roman" panose="02020603050405020304" pitchFamily="18" charset="0"/>
+                  </a:rPr>
+                  <a:t>- Decrypt file blocks  (</a:t>
+                </a:r>
+                <a14:m>
+                  <m:oMath xmlns:m="http://schemas.openxmlformats.org/officeDocument/2006/math">
+                    <m:sSub>
+                      <m:sSubPr>
+                        <m:ctrlPr>
+                          <a:rPr lang="en-SG" sz="1400" b="1" i="1">
+                            <a:latin typeface="Cambria Math" panose="02040503050406030204" pitchFamily="18" charset="0"/>
+                            <a:cs typeface="Times New Roman" panose="02020603050405020304" pitchFamily="18" charset="0"/>
+                          </a:rPr>
+                        </m:ctrlPr>
+                      </m:sSubPr>
+                      <m:e>
+                        <m:r>
+                          <a:rPr lang="en-SG" sz="1400" b="1" i="1">
+                            <a:latin typeface="Cambria Math" panose="02040503050406030204" pitchFamily="18" charset="0"/>
+                            <a:cs typeface="Times New Roman" panose="02020603050405020304" pitchFamily="18" charset="0"/>
+                          </a:rPr>
+                          <m:t>𝑲</m:t>
+                        </m:r>
+                      </m:e>
+                      <m:sub>
+                        <m:r>
+                          <a:rPr lang="en-SG" sz="1400" b="1" i="1">
+                            <a:latin typeface="Cambria Math" panose="02040503050406030204" pitchFamily="18" charset="0"/>
+                            <a:cs typeface="Times New Roman" panose="02020603050405020304" pitchFamily="18" charset="0"/>
+                          </a:rPr>
+                          <m:t>𝒔𝒆𝒔𝒔</m:t>
+                        </m:r>
+                      </m:sub>
+                    </m:sSub>
+                  </m:oMath>
+                </a14:m>
+                <a:r>
+                  <a:rPr lang="en-SG" sz="1400" dirty="0">
+                    <a:latin typeface="Times New Roman" panose="02020603050405020304" pitchFamily="18" charset="0"/>
+                    <a:cs typeface="Times New Roman" panose="02020603050405020304" pitchFamily="18" charset="0"/>
+                  </a:rPr>
+                  <a:t>(file block))</a:t>
+                </a:r>
+              </a:p>
+            </p:txBody>
+          </p:sp>
+        </mc:Choice>
+        <mc:Fallback>
+          <p:sp>
+            <p:nvSpPr>
+              <p:cNvPr id="47" name="TextBox 46">
+                <a:extLst>
+                  <a:ext uri="{FF2B5EF4-FFF2-40B4-BE49-F238E27FC236}">
+                    <a16:creationId xmlns:a16="http://schemas.microsoft.com/office/drawing/2014/main" id="{BD3906B7-D81D-4CAA-BE6B-148421D6B084}"/>
+                  </a:ext>
+                </a:extLst>
+              </p:cNvPr>
+              <p:cNvSpPr txBox="1">
+                <a:spLocks noRot="1" noChangeAspect="1" noMove="1" noResize="1" noEditPoints="1" noAdjustHandles="1" noChangeArrowheads="1" noChangeShapeType="1" noTextEdit="1"/>
+              </p:cNvSpPr>
+              <p:nvPr/>
+            </p:nvSpPr>
+            <p:spPr>
+              <a:xfrm>
+                <a:off x="5526370" y="7622301"/>
+                <a:ext cx="1809096" cy="523220"/>
+              </a:xfrm>
+              <a:prstGeom prst="rect">
+                <a:avLst/>
+              </a:prstGeom>
+              <a:blipFill>
+                <a:blip r:embed="rId11"/>
+                <a:stretch>
+                  <a:fillRect l="-671" b="-10227"/>
+                </a:stretch>
+              </a:blipFill>
+              <a:ln>
+                <a:solidFill>
+                  <a:schemeClr val="tx1"/>
+                </a:solidFill>
+              </a:ln>
+            </p:spPr>
+            <p:txBody>
+              <a:bodyPr/>
+              <a:lstStyle/>
+              <a:p>
+                <a:r>
+                  <a:rPr lang="en-SG">
+                    <a:noFill/>
+                  </a:rPr>
+                  <a:t> </a:t>
+                </a:r>
+              </a:p>
+            </p:txBody>
+          </p:sp>
+        </mc:Fallback>
+      </mc:AlternateContent>
+      <mc:AlternateContent xmlns:mc="http://schemas.openxmlformats.org/markup-compatibility/2006">
+        <mc:Choice xmlns:a14="http://schemas.microsoft.com/office/drawing/2010/main" Requires="a14">
+          <p:sp>
+            <p:nvSpPr>
+              <p:cNvPr id="48" name="TextBox 47">
+                <a:extLst>
+                  <a:ext uri="{FF2B5EF4-FFF2-40B4-BE49-F238E27FC236}">
+                    <a16:creationId xmlns:a16="http://schemas.microsoft.com/office/drawing/2014/main" id="{03033782-259F-4F39-B879-18CB63D80BDA}"/>
+                  </a:ext>
+                </a:extLst>
+              </p:cNvPr>
+              <p:cNvSpPr txBox="1"/>
+              <p:nvPr/>
+            </p:nvSpPr>
+            <p:spPr>
+              <a:xfrm>
+                <a:off x="5526369" y="6960296"/>
+                <a:ext cx="1809097" cy="523220"/>
+              </a:xfrm>
+              <a:prstGeom prst="rect">
+                <a:avLst/>
+              </a:prstGeom>
+              <a:noFill/>
+              <a:ln>
+                <a:solidFill>
+                  <a:schemeClr val="tx1"/>
+                </a:solidFill>
+              </a:ln>
+            </p:spPr>
+            <p:txBody>
+              <a:bodyPr wrap="square" rtlCol="0">
+                <a:spAutoFit/>
+              </a:bodyPr>
+              <a:lstStyle/>
+              <a:p>
+                <a:r>
+                  <a:rPr lang="en-SG" sz="1400" dirty="0">
+                    <a:latin typeface="Times New Roman" panose="02020603050405020304" pitchFamily="18" charset="0"/>
+                    <a:cs typeface="Times New Roman" panose="02020603050405020304" pitchFamily="18" charset="0"/>
+                  </a:rPr>
+                  <a:t>- Decrypt file name  (</a:t>
+                </a:r>
+                <a14:m>
+                  <m:oMath xmlns:m="http://schemas.openxmlformats.org/officeDocument/2006/math">
+                    <m:sSub>
+                      <m:sSubPr>
+                        <m:ctrlPr>
+                          <a:rPr lang="en-SG" sz="1400" b="1" i="1">
+                            <a:latin typeface="Cambria Math" panose="02040503050406030204" pitchFamily="18" charset="0"/>
+                            <a:cs typeface="Times New Roman" panose="02020603050405020304" pitchFamily="18" charset="0"/>
+                          </a:rPr>
+                        </m:ctrlPr>
+                      </m:sSubPr>
+                      <m:e>
+                        <m:r>
+                          <a:rPr lang="en-SG" sz="1400" b="1" i="1">
+                            <a:latin typeface="Cambria Math" panose="02040503050406030204" pitchFamily="18" charset="0"/>
+                            <a:cs typeface="Times New Roman" panose="02020603050405020304" pitchFamily="18" charset="0"/>
+                          </a:rPr>
+                          <m:t>𝑲</m:t>
+                        </m:r>
+                      </m:e>
+                      <m:sub>
+                        <m:r>
+                          <a:rPr lang="en-SG" sz="1400" b="1" i="1">
+                            <a:latin typeface="Cambria Math" panose="02040503050406030204" pitchFamily="18" charset="0"/>
+                            <a:cs typeface="Times New Roman" panose="02020603050405020304" pitchFamily="18" charset="0"/>
+                          </a:rPr>
+                          <m:t>𝒔𝒆𝒔𝒔</m:t>
+                        </m:r>
+                      </m:sub>
+                    </m:sSub>
+                  </m:oMath>
+                </a14:m>
+                <a:r>
+                  <a:rPr lang="en-SG" sz="1400" dirty="0">
+                    <a:latin typeface="Times New Roman" panose="02020603050405020304" pitchFamily="18" charset="0"/>
+                    <a:cs typeface="Times New Roman" panose="02020603050405020304" pitchFamily="18" charset="0"/>
+                  </a:rPr>
+                  <a:t>(file name))</a:t>
+                </a:r>
+              </a:p>
+            </p:txBody>
+          </p:sp>
+        </mc:Choice>
+        <mc:Fallback>
+          <p:sp>
+            <p:nvSpPr>
+              <p:cNvPr id="48" name="TextBox 47">
+                <a:extLst>
+                  <a:ext uri="{FF2B5EF4-FFF2-40B4-BE49-F238E27FC236}">
+                    <a16:creationId xmlns:a16="http://schemas.microsoft.com/office/drawing/2014/main" id="{03033782-259F-4F39-B879-18CB63D80BDA}"/>
+                  </a:ext>
+                </a:extLst>
+              </p:cNvPr>
+              <p:cNvSpPr txBox="1">
+                <a:spLocks noRot="1" noChangeAspect="1" noMove="1" noResize="1" noEditPoints="1" noAdjustHandles="1" noChangeArrowheads="1" noChangeShapeType="1" noTextEdit="1"/>
+              </p:cNvSpPr>
+              <p:nvPr/>
+            </p:nvSpPr>
+            <p:spPr>
+              <a:xfrm>
+                <a:off x="5526369" y="6960296"/>
+                <a:ext cx="1809097" cy="523220"/>
+              </a:xfrm>
+              <a:prstGeom prst="rect">
+                <a:avLst/>
+              </a:prstGeom>
+              <a:blipFill>
+                <a:blip r:embed="rId12"/>
+                <a:stretch>
+                  <a:fillRect l="-671" t="-1136" b="-9091"/>
+                </a:stretch>
+              </a:blipFill>
+              <a:ln>
+                <a:solidFill>
+                  <a:schemeClr val="tx1"/>
+                </a:solidFill>
+              </a:ln>
+            </p:spPr>
+            <p:txBody>
+              <a:bodyPr/>
+              <a:lstStyle/>
+              <a:p>
+                <a:r>
+                  <a:rPr lang="en-SG">
+                    <a:noFill/>
+                  </a:rPr>
+                  <a:t> </a:t>
+                </a:r>
+              </a:p>
+            </p:txBody>
+          </p:sp>
+        </mc:Fallback>
+      </mc:AlternateContent>
+      <p:sp>
+        <p:nvSpPr>
+          <p:cNvPr id="50" name="TextBox 49">
+            <a:extLst>
+              <a:ext uri="{FF2B5EF4-FFF2-40B4-BE49-F238E27FC236}">
+                <a16:creationId xmlns:a16="http://schemas.microsoft.com/office/drawing/2014/main" id="{48DAF81F-78FC-4CA9-A5A4-E3909581D8F0}"/>
+              </a:ext>
+            </a:extLst>
+          </p:cNvPr>
+          <p:cNvSpPr txBox="1"/>
+          <p:nvPr/>
+        </p:nvSpPr>
+        <p:spPr>
+          <a:xfrm>
+            <a:off x="2771110" y="226425"/>
+            <a:ext cx="1184940" cy="646331"/>
+          </a:xfrm>
+          <a:prstGeom prst="rect">
+            <a:avLst/>
+          </a:prstGeom>
+          <a:noFill/>
+        </p:spPr>
+        <p:txBody>
+          <a:bodyPr wrap="none" rtlCol="0">
+            <a:spAutoFit/>
+          </a:bodyPr>
+          <a:lstStyle/>
+          <a:p>
+            <a:r>
+              <a:rPr lang="en-SG" sz="3600" b="1" dirty="0">
+                <a:latin typeface="Times New Roman" panose="02020603050405020304" pitchFamily="18" charset="0"/>
+                <a:cs typeface="Times New Roman" panose="02020603050405020304" pitchFamily="18" charset="0"/>
+              </a:rPr>
+              <a:t>CP-1</a:t>
+            </a:r>
+          </a:p>
+        </p:txBody>
+      </p:sp>
+      <p:pic>
+        <p:nvPicPr>
+          <p:cNvPr id="49" name="Picture 48">
+            <a:extLst>
+              <a:ext uri="{FF2B5EF4-FFF2-40B4-BE49-F238E27FC236}">
+                <a16:creationId xmlns:a16="http://schemas.microsoft.com/office/drawing/2014/main" id="{57C0914F-0F61-4985-B56F-52F8E7BB9D41}"/>
+              </a:ext>
+            </a:extLst>
+          </p:cNvPr>
+          <p:cNvPicPr/>
+          <p:nvPr/>
+        </p:nvPicPr>
+        <p:blipFill>
+          <a:blip r:embed="rId13">
+            <a:extLst>
+              <a:ext uri="{28A0092B-C50C-407E-A947-70E740481C1C}">
+                <a14:useLocalDpi xmlns:a14="http://schemas.microsoft.com/office/drawing/2010/main" val="0"/>
+              </a:ext>
+            </a:extLst>
+          </a:blip>
+          <a:srcRect/>
+          <a:stretch>
+            <a:fillRect/>
+          </a:stretch>
+        </p:blipFill>
+        <p:spPr bwMode="auto">
+          <a:xfrm>
+            <a:off x="-9389134" y="-95101"/>
+            <a:ext cx="5847470" cy="9567173"/>
+          </a:xfrm>
+          <a:prstGeom prst="rect">
+            <a:avLst/>
+          </a:prstGeom>
+          <a:noFill/>
+          <a:ln>
+            <a:noFill/>
+          </a:ln>
+        </p:spPr>
+      </p:pic>
+      <mc:AlternateContent xmlns:mc="http://schemas.openxmlformats.org/markup-compatibility/2006">
+        <mc:Choice xmlns:a14="http://schemas.microsoft.com/office/drawing/2010/main" Requires="a14">
+          <p:sp>
+            <p:nvSpPr>
+              <p:cNvPr id="51" name="TextBox 50">
+                <a:extLst>
+                  <a:ext uri="{FF2B5EF4-FFF2-40B4-BE49-F238E27FC236}">
+                    <a16:creationId xmlns:a16="http://schemas.microsoft.com/office/drawing/2014/main" id="{23876553-B710-44FE-A098-8AD3EBF8F73D}"/>
+                  </a:ext>
+                </a:extLst>
+              </p:cNvPr>
+              <p:cNvSpPr txBox="1"/>
+              <p:nvPr/>
+            </p:nvSpPr>
+            <p:spPr>
+              <a:xfrm>
+                <a:off x="5526369" y="5788379"/>
+                <a:ext cx="3788689" cy="738664"/>
+              </a:xfrm>
+              <a:prstGeom prst="rect">
+                <a:avLst/>
+              </a:prstGeom>
+              <a:noFill/>
+              <a:ln>
+                <a:solidFill>
+                  <a:schemeClr val="tx1"/>
+                </a:solidFill>
+              </a:ln>
+            </p:spPr>
+            <p:txBody>
+              <a:bodyPr wrap="square" rtlCol="0">
+                <a:spAutoFit/>
+              </a:bodyPr>
+              <a:lstStyle/>
+              <a:p>
+                <a:r>
+                  <a:rPr lang="en-SG" sz="1400" dirty="0">
+                    <a:latin typeface="Times New Roman" panose="02020603050405020304" pitchFamily="18" charset="0"/>
+                    <a:cs typeface="Times New Roman" panose="02020603050405020304" pitchFamily="18" charset="0"/>
+                  </a:rPr>
+                  <a:t>- Decrypt Session Key  </a:t>
+                </a:r>
+                <a:br>
+                  <a:rPr lang="en-SG" sz="1400" dirty="0">
+                    <a:latin typeface="Times New Roman" panose="02020603050405020304" pitchFamily="18" charset="0"/>
+                    <a:cs typeface="Times New Roman" panose="02020603050405020304" pitchFamily="18" charset="0"/>
+                  </a:rPr>
+                </a:br>
+                <a:r>
+                  <a:rPr lang="en-SG" sz="1400" dirty="0">
+                    <a:latin typeface="Times New Roman" panose="02020603050405020304" pitchFamily="18" charset="0"/>
+                    <a:cs typeface="Times New Roman" panose="02020603050405020304" pitchFamily="18" charset="0"/>
+                  </a:rPr>
+                  <a:t>(</a:t>
+                </a:r>
+                <a14:m>
+                  <m:oMath xmlns:m="http://schemas.openxmlformats.org/officeDocument/2006/math">
+                    <m:sSubSup>
+                      <m:sSubSupPr>
+                        <m:ctrlPr>
+                          <a:rPr lang="en-SG" sz="1400" b="1" i="1">
+                            <a:latin typeface="Cambria Math" panose="02040503050406030204" pitchFamily="18" charset="0"/>
+                            <a:cs typeface="Times New Roman" panose="02020603050405020304" pitchFamily="18" charset="0"/>
+                          </a:rPr>
+                        </m:ctrlPr>
+                      </m:sSubSupPr>
+                      <m:e>
+                        <m:r>
+                          <a:rPr lang="en-SG" sz="1400" b="1" i="1">
+                            <a:latin typeface="Cambria Math" panose="02040503050406030204" pitchFamily="18" charset="0"/>
+                            <a:cs typeface="Times New Roman" panose="02020603050405020304" pitchFamily="18" charset="0"/>
+                          </a:rPr>
+                          <m:t>𝑲</m:t>
+                        </m:r>
+                      </m:e>
+                      <m:sub>
+                        <m:r>
+                          <a:rPr lang="en-SG" sz="1400" b="1" i="1">
+                            <a:latin typeface="Cambria Math" panose="02040503050406030204" pitchFamily="18" charset="0"/>
+                            <a:cs typeface="Times New Roman" panose="02020603050405020304" pitchFamily="18" charset="0"/>
+                          </a:rPr>
+                          <m:t>𝑺</m:t>
+                        </m:r>
+                      </m:sub>
+                      <m:sup>
+                        <m:r>
+                          <a:rPr lang="en-SG" sz="1400" b="1" i="1">
+                            <a:latin typeface="Cambria Math" panose="02040503050406030204" pitchFamily="18" charset="0"/>
+                            <a:cs typeface="Times New Roman" panose="02020603050405020304" pitchFamily="18" charset="0"/>
+                          </a:rPr>
+                          <m:t>−</m:t>
+                        </m:r>
+                      </m:sup>
+                    </m:sSubSup>
+                  </m:oMath>
+                </a14:m>
+                <a:r>
+                  <a:rPr lang="en-SG" sz="1400" dirty="0">
+                    <a:latin typeface="Times New Roman" panose="02020603050405020304" pitchFamily="18" charset="0"/>
+                    <a:cs typeface="Times New Roman" panose="02020603050405020304" pitchFamily="18" charset="0"/>
+                  </a:rPr>
+                  <a:t>(</a:t>
+                </a:r>
+                <a14:m>
+                  <m:oMath xmlns:m="http://schemas.openxmlformats.org/officeDocument/2006/math">
+                    <m:sSubSup>
+                      <m:sSubSupPr>
+                        <m:ctrlPr>
+                          <a:rPr lang="en-SG" sz="1400" b="1" i="1">
+                            <a:latin typeface="Cambria Math" panose="02040503050406030204" pitchFamily="18" charset="0"/>
+                            <a:cs typeface="Times New Roman" panose="02020603050405020304" pitchFamily="18" charset="0"/>
+                          </a:rPr>
+                        </m:ctrlPr>
+                      </m:sSubSupPr>
+                      <m:e>
+                        <m:r>
+                          <a:rPr lang="en-SG" sz="1400" b="1" i="1">
+                            <a:latin typeface="Cambria Math" panose="02040503050406030204" pitchFamily="18" charset="0"/>
+                            <a:cs typeface="Times New Roman" panose="02020603050405020304" pitchFamily="18" charset="0"/>
+                          </a:rPr>
+                          <m:t>𝑲</m:t>
+                        </m:r>
+                      </m:e>
+                      <m:sub>
+                        <m:r>
+                          <a:rPr lang="en-SG" sz="1400" b="1" i="1">
+                            <a:latin typeface="Cambria Math" panose="02040503050406030204" pitchFamily="18" charset="0"/>
+                            <a:cs typeface="Times New Roman" panose="02020603050405020304" pitchFamily="18" charset="0"/>
+                          </a:rPr>
+                          <m:t>𝒔</m:t>
+                        </m:r>
+                      </m:sub>
+                      <m:sup>
+                        <m:r>
+                          <a:rPr lang="en-SG" sz="1400" b="1" i="1">
+                            <a:latin typeface="Cambria Math" panose="02040503050406030204" pitchFamily="18" charset="0"/>
+                            <a:cs typeface="Times New Roman" panose="02020603050405020304" pitchFamily="18" charset="0"/>
+                          </a:rPr>
+                          <m:t>+</m:t>
+                        </m:r>
+                      </m:sup>
+                    </m:sSubSup>
+                  </m:oMath>
+                </a14:m>
+                <a:r>
+                  <a:rPr lang="en-SG" sz="1400" dirty="0">
+                    <a:latin typeface="Times New Roman" panose="02020603050405020304" pitchFamily="18" charset="0"/>
+                    <a:cs typeface="Times New Roman" panose="02020603050405020304" pitchFamily="18" charset="0"/>
+                  </a:rPr>
+                  <a:t>(Session Key)) =  Session Key ; </a:t>
+                </a:r>
+              </a:p>
+              <a:p>
+                <a:r>
+                  <a:rPr lang="en-SG" sz="1400" dirty="0">
+                    <a:latin typeface="Times New Roman" panose="02020603050405020304" pitchFamily="18" charset="0"/>
+                    <a:cs typeface="Times New Roman" panose="02020603050405020304" pitchFamily="18" charset="0"/>
+                  </a:rPr>
+                  <a:t>- Let Session Key be</a:t>
+                </a:r>
+                <a:r>
+                  <a:rPr lang="en-SG" sz="1400" b="1" dirty="0">
+                    <a:latin typeface="Times New Roman" panose="02020603050405020304" pitchFamily="18" charset="0"/>
+                    <a:cs typeface="Times New Roman" panose="02020603050405020304" pitchFamily="18" charset="0"/>
+                  </a:rPr>
+                  <a:t> </a:t>
+                </a:r>
+                <a14:m>
+                  <m:oMath xmlns:m="http://schemas.openxmlformats.org/officeDocument/2006/math">
+                    <m:sSub>
+                      <m:sSubPr>
+                        <m:ctrlPr>
+                          <a:rPr lang="en-SG" sz="1400" b="1" i="1" smtClean="0">
+                            <a:latin typeface="Cambria Math" panose="02040503050406030204" pitchFamily="18" charset="0"/>
+                            <a:cs typeface="Times New Roman" panose="02020603050405020304" pitchFamily="18" charset="0"/>
+                          </a:rPr>
+                        </m:ctrlPr>
+                      </m:sSubPr>
+                      <m:e>
+                        <m:r>
+                          <a:rPr lang="en-SG" sz="1400" b="1" i="1" smtClean="0">
+                            <a:latin typeface="Cambria Math" panose="02040503050406030204" pitchFamily="18" charset="0"/>
+                            <a:cs typeface="Times New Roman" panose="02020603050405020304" pitchFamily="18" charset="0"/>
+                          </a:rPr>
+                          <m:t>𝑲</m:t>
+                        </m:r>
+                      </m:e>
+                      <m:sub>
+                        <m:r>
+                          <a:rPr lang="en-SG" sz="1400" b="1" i="1" smtClean="0">
+                            <a:latin typeface="Cambria Math" panose="02040503050406030204" pitchFamily="18" charset="0"/>
+                            <a:cs typeface="Times New Roman" panose="02020603050405020304" pitchFamily="18" charset="0"/>
+                          </a:rPr>
+                          <m:t>𝒔𝒆𝒔𝒔</m:t>
+                        </m:r>
+                      </m:sub>
+                    </m:sSub>
+                  </m:oMath>
+                </a14:m>
+                <a:endParaRPr lang="en-SG" sz="1400" b="1" dirty="0">
+                  <a:latin typeface="Times New Roman" panose="02020603050405020304" pitchFamily="18" charset="0"/>
+                  <a:cs typeface="Times New Roman" panose="02020603050405020304" pitchFamily="18" charset="0"/>
+                </a:endParaRPr>
+              </a:p>
+            </p:txBody>
+          </p:sp>
+        </mc:Choice>
+        <mc:Fallback>
+          <p:sp>
+            <p:nvSpPr>
+              <p:cNvPr id="51" name="TextBox 50">
+                <a:extLst>
+                  <a:ext uri="{FF2B5EF4-FFF2-40B4-BE49-F238E27FC236}">
+                    <a16:creationId xmlns:a16="http://schemas.microsoft.com/office/drawing/2014/main" id="{23876553-B710-44FE-A098-8AD3EBF8F73D}"/>
+                  </a:ext>
+                </a:extLst>
+              </p:cNvPr>
+              <p:cNvSpPr txBox="1">
+                <a:spLocks noRot="1" noChangeAspect="1" noMove="1" noResize="1" noEditPoints="1" noAdjustHandles="1" noChangeArrowheads="1" noChangeShapeType="1" noTextEdit="1"/>
+              </p:cNvSpPr>
+              <p:nvPr/>
+            </p:nvSpPr>
+            <p:spPr>
+              <a:xfrm>
+                <a:off x="5526369" y="5788379"/>
+                <a:ext cx="3788689" cy="738664"/>
+              </a:xfrm>
+              <a:prstGeom prst="rect">
+                <a:avLst/>
+              </a:prstGeom>
+              <a:blipFill>
+                <a:blip r:embed="rId14"/>
+                <a:stretch>
+                  <a:fillRect l="-321" t="-813" b="-6504"/>
+                </a:stretch>
+              </a:blipFill>
+              <a:ln>
+                <a:solidFill>
+                  <a:schemeClr val="tx1"/>
+                </a:solidFill>
+              </a:ln>
+            </p:spPr>
+            <p:txBody>
+              <a:bodyPr/>
+              <a:lstStyle/>
+              <a:p>
+                <a:r>
+                  <a:rPr lang="en-SG">
+                    <a:noFill/>
+                  </a:rPr>
+                  <a:t> </a:t>
+                </a:r>
+              </a:p>
+            </p:txBody>
+          </p:sp>
+        </mc:Fallback>
+      </mc:AlternateContent>
+      <mc:AlternateContent xmlns:mc="http://schemas.openxmlformats.org/markup-compatibility/2006">
+        <mc:Choice xmlns:a14="http://schemas.microsoft.com/office/drawing/2010/main" Requires="a14">
+          <p:sp>
+            <p:nvSpPr>
+              <p:cNvPr id="52" name="TextBox 51">
+                <a:extLst>
+                  <a:ext uri="{FF2B5EF4-FFF2-40B4-BE49-F238E27FC236}">
+                    <a16:creationId xmlns:a16="http://schemas.microsoft.com/office/drawing/2014/main" id="{085CFE2F-7961-4E34-91CF-E58DD3A4FDCB}"/>
+                  </a:ext>
+                </a:extLst>
+              </p:cNvPr>
+              <p:cNvSpPr txBox="1"/>
+              <p:nvPr/>
+            </p:nvSpPr>
+            <p:spPr>
+              <a:xfrm>
+                <a:off x="-406518" y="7236018"/>
+                <a:ext cx="1809096" cy="523220"/>
+              </a:xfrm>
+              <a:prstGeom prst="rect">
+                <a:avLst/>
+              </a:prstGeom>
+              <a:noFill/>
+              <a:ln>
+                <a:solidFill>
+                  <a:schemeClr val="tx1"/>
+                </a:solidFill>
+              </a:ln>
+            </p:spPr>
+            <p:txBody>
+              <a:bodyPr wrap="square" rtlCol="0">
+                <a:spAutoFit/>
+              </a:bodyPr>
+              <a:lstStyle/>
+              <a:p>
+                <a:r>
+                  <a:rPr lang="en-SG" sz="1400" dirty="0">
+                    <a:latin typeface="Times New Roman" panose="02020603050405020304" pitchFamily="18" charset="0"/>
+                    <a:cs typeface="Times New Roman" panose="02020603050405020304" pitchFamily="18" charset="0"/>
+                  </a:rPr>
+                  <a:t>- Encrypt file blocks  (</a:t>
+                </a:r>
+                <a14:m>
+                  <m:oMath xmlns:m="http://schemas.openxmlformats.org/officeDocument/2006/math">
+                    <m:sSub>
+                      <m:sSubPr>
+                        <m:ctrlPr>
+                          <a:rPr lang="en-SG" sz="1400" b="1" i="1">
+                            <a:latin typeface="Cambria Math" panose="02040503050406030204" pitchFamily="18" charset="0"/>
+                            <a:cs typeface="Times New Roman" panose="02020603050405020304" pitchFamily="18" charset="0"/>
+                          </a:rPr>
+                        </m:ctrlPr>
+                      </m:sSubPr>
+                      <m:e>
+                        <m:r>
+                          <a:rPr lang="en-SG" sz="1400" b="1" i="1">
+                            <a:latin typeface="Cambria Math" panose="02040503050406030204" pitchFamily="18" charset="0"/>
+                            <a:cs typeface="Times New Roman" panose="02020603050405020304" pitchFamily="18" charset="0"/>
+                          </a:rPr>
+                          <m:t>𝑲</m:t>
+                        </m:r>
+                      </m:e>
+                      <m:sub>
+                        <m:r>
+                          <a:rPr lang="en-SG" sz="1400" b="1" i="1">
+                            <a:latin typeface="Cambria Math" panose="02040503050406030204" pitchFamily="18" charset="0"/>
+                            <a:cs typeface="Times New Roman" panose="02020603050405020304" pitchFamily="18" charset="0"/>
+                          </a:rPr>
+                          <m:t>𝒔𝒆𝒔𝒔</m:t>
+                        </m:r>
+                      </m:sub>
+                    </m:sSub>
+                  </m:oMath>
+                </a14:m>
+                <a:r>
+                  <a:rPr lang="en-SG" sz="1400" dirty="0">
+                    <a:latin typeface="Times New Roman" panose="02020603050405020304" pitchFamily="18" charset="0"/>
+                    <a:cs typeface="Times New Roman" panose="02020603050405020304" pitchFamily="18" charset="0"/>
+                  </a:rPr>
+                  <a:t>(file block))</a:t>
+                </a:r>
+              </a:p>
+            </p:txBody>
+          </p:sp>
+        </mc:Choice>
+        <mc:Fallback>
+          <p:sp>
+            <p:nvSpPr>
+              <p:cNvPr id="52" name="TextBox 51">
+                <a:extLst>
+                  <a:ext uri="{FF2B5EF4-FFF2-40B4-BE49-F238E27FC236}">
+                    <a16:creationId xmlns:a16="http://schemas.microsoft.com/office/drawing/2014/main" id="{085CFE2F-7961-4E34-91CF-E58DD3A4FDCB}"/>
+                  </a:ext>
+                </a:extLst>
+              </p:cNvPr>
+              <p:cNvSpPr txBox="1">
+                <a:spLocks noRot="1" noChangeAspect="1" noMove="1" noResize="1" noEditPoints="1" noAdjustHandles="1" noChangeArrowheads="1" noChangeShapeType="1" noTextEdit="1"/>
+              </p:cNvSpPr>
+              <p:nvPr/>
+            </p:nvSpPr>
+            <p:spPr>
+              <a:xfrm>
+                <a:off x="-406518" y="7236018"/>
+                <a:ext cx="1809096" cy="523220"/>
+              </a:xfrm>
+              <a:prstGeom prst="rect">
+                <a:avLst/>
+              </a:prstGeom>
+              <a:blipFill>
+                <a:blip r:embed="rId15"/>
+                <a:stretch>
+                  <a:fillRect l="-669" t="-1136" b="-10227"/>
+                </a:stretch>
+              </a:blipFill>
+              <a:ln>
+                <a:solidFill>
+                  <a:schemeClr val="tx1"/>
+                </a:solidFill>
+              </a:ln>
+            </p:spPr>
+            <p:txBody>
+              <a:bodyPr/>
+              <a:lstStyle/>
+              <a:p>
+                <a:r>
+                  <a:rPr lang="en-SG">
+                    <a:noFill/>
+                  </a:rPr>
+                  <a:t> </a:t>
+                </a:r>
+              </a:p>
+            </p:txBody>
+          </p:sp>
+        </mc:Fallback>
+      </mc:AlternateContent>
+      <mc:AlternateContent xmlns:mc="http://schemas.openxmlformats.org/markup-compatibility/2006">
+        <mc:Choice xmlns:a14="http://schemas.microsoft.com/office/drawing/2010/main" Requires="a14">
+          <p:sp>
+            <p:nvSpPr>
+              <p:cNvPr id="53" name="TextBox 52">
+                <a:extLst>
+                  <a:ext uri="{FF2B5EF4-FFF2-40B4-BE49-F238E27FC236}">
+                    <a16:creationId xmlns:a16="http://schemas.microsoft.com/office/drawing/2014/main" id="{A54D3DE5-F2FF-46CA-9C5C-C0361AB11602}"/>
+                  </a:ext>
+                </a:extLst>
+              </p:cNvPr>
+              <p:cNvSpPr txBox="1"/>
+              <p:nvPr/>
+            </p:nvSpPr>
+            <p:spPr>
+              <a:xfrm>
+                <a:off x="-406519" y="6574013"/>
+                <a:ext cx="1809097" cy="523220"/>
+              </a:xfrm>
+              <a:prstGeom prst="rect">
+                <a:avLst/>
+              </a:prstGeom>
+              <a:noFill/>
+              <a:ln>
+                <a:solidFill>
+                  <a:schemeClr val="tx1"/>
+                </a:solidFill>
+              </a:ln>
+            </p:spPr>
+            <p:txBody>
+              <a:bodyPr wrap="square" rtlCol="0">
+                <a:spAutoFit/>
+              </a:bodyPr>
+              <a:lstStyle/>
+              <a:p>
+                <a:r>
+                  <a:rPr lang="en-SG" sz="1400" dirty="0">
+                    <a:latin typeface="Times New Roman" panose="02020603050405020304" pitchFamily="18" charset="0"/>
+                    <a:cs typeface="Times New Roman" panose="02020603050405020304" pitchFamily="18" charset="0"/>
+                  </a:rPr>
+                  <a:t>- Encrypt file name  (</a:t>
+                </a:r>
+                <a14:m>
+                  <m:oMath xmlns:m="http://schemas.openxmlformats.org/officeDocument/2006/math">
+                    <m:sSub>
+                      <m:sSubPr>
+                        <m:ctrlPr>
+                          <a:rPr lang="en-SG" sz="1400" b="1" i="1">
+                            <a:latin typeface="Cambria Math" panose="02040503050406030204" pitchFamily="18" charset="0"/>
+                            <a:cs typeface="Times New Roman" panose="02020603050405020304" pitchFamily="18" charset="0"/>
+                          </a:rPr>
+                        </m:ctrlPr>
+                      </m:sSubPr>
+                      <m:e>
+                        <m:r>
+                          <a:rPr lang="en-SG" sz="1400" b="1" i="1">
+                            <a:latin typeface="Cambria Math" panose="02040503050406030204" pitchFamily="18" charset="0"/>
+                            <a:cs typeface="Times New Roman" panose="02020603050405020304" pitchFamily="18" charset="0"/>
+                          </a:rPr>
+                          <m:t>𝑲</m:t>
+                        </m:r>
+                      </m:e>
+                      <m:sub>
+                        <m:r>
+                          <a:rPr lang="en-SG" sz="1400" b="1" i="1">
+                            <a:latin typeface="Cambria Math" panose="02040503050406030204" pitchFamily="18" charset="0"/>
+                            <a:cs typeface="Times New Roman" panose="02020603050405020304" pitchFamily="18" charset="0"/>
+                          </a:rPr>
+                          <m:t>𝒔𝒆𝒔𝒔</m:t>
+                        </m:r>
+                      </m:sub>
+                    </m:sSub>
+                  </m:oMath>
+                </a14:m>
+                <a:r>
+                  <a:rPr lang="en-SG" sz="1400" dirty="0">
+                    <a:latin typeface="Times New Roman" panose="02020603050405020304" pitchFamily="18" charset="0"/>
+                    <a:cs typeface="Times New Roman" panose="02020603050405020304" pitchFamily="18" charset="0"/>
+                  </a:rPr>
+                  <a:t>(file name))</a:t>
+                </a:r>
+              </a:p>
+            </p:txBody>
+          </p:sp>
+        </mc:Choice>
+        <mc:Fallback>
+          <p:sp>
+            <p:nvSpPr>
+              <p:cNvPr id="53" name="TextBox 52">
+                <a:extLst>
+                  <a:ext uri="{FF2B5EF4-FFF2-40B4-BE49-F238E27FC236}">
+                    <a16:creationId xmlns:a16="http://schemas.microsoft.com/office/drawing/2014/main" id="{A54D3DE5-F2FF-46CA-9C5C-C0361AB11602}"/>
+                  </a:ext>
+                </a:extLst>
+              </p:cNvPr>
+              <p:cNvSpPr txBox="1">
+                <a:spLocks noRot="1" noChangeAspect="1" noMove="1" noResize="1" noEditPoints="1" noAdjustHandles="1" noChangeArrowheads="1" noChangeShapeType="1" noTextEdit="1"/>
+              </p:cNvSpPr>
+              <p:nvPr/>
+            </p:nvSpPr>
+            <p:spPr>
+              <a:xfrm>
+                <a:off x="-406519" y="6574013"/>
+                <a:ext cx="1809097" cy="523220"/>
+              </a:xfrm>
+              <a:prstGeom prst="rect">
+                <a:avLst/>
+              </a:prstGeom>
+              <a:blipFill>
+                <a:blip r:embed="rId16"/>
+                <a:stretch>
+                  <a:fillRect l="-669" b="-10227"/>
+                </a:stretch>
+              </a:blipFill>
+              <a:ln>
+                <a:solidFill>
+                  <a:schemeClr val="tx1"/>
+                </a:solidFill>
+              </a:ln>
+            </p:spPr>
+            <p:txBody>
+              <a:bodyPr/>
+              <a:lstStyle/>
+              <a:p>
+                <a:r>
+                  <a:rPr lang="en-SG">
+                    <a:noFill/>
+                  </a:rPr>
+                  <a:t> </a:t>
+                </a:r>
+              </a:p>
+            </p:txBody>
+          </p:sp>
+        </mc:Fallback>
+      </mc:AlternateContent>
+    </p:spTree>
+    <p:extLst>
+      <p:ext uri="{BB962C8B-B14F-4D97-AF65-F5344CB8AC3E}">
+        <p14:creationId xmlns:p14="http://schemas.microsoft.com/office/powerpoint/2010/main" val="2995543733"/>
       </p:ext>
     </p:extLst>
   </p:cSld>

</xml_diff>

<commit_message>
Updated diagrams and report
</commit_message>
<xml_diff>
--- a/Report & Diagrams/Presentation1.pptx
+++ b/Report & Diagrams/Presentation1.pptx
@@ -245,7 +245,7 @@
           <a:p>
             <a:fld id="{F6D0DC95-96D7-4443-A9FE-D9D3645C5F4E}" type="datetimeFigureOut">
               <a:rPr lang="en-SG" smtClean="0"/>
-              <a:t>12/4/2019</a:t>
+              <a:t>18/4/2019</a:t>
             </a:fld>
             <a:endParaRPr lang="en-SG"/>
           </a:p>
@@ -415,7 +415,7 @@
           <a:p>
             <a:fld id="{F6D0DC95-96D7-4443-A9FE-D9D3645C5F4E}" type="datetimeFigureOut">
               <a:rPr lang="en-SG" smtClean="0"/>
-              <a:t>12/4/2019</a:t>
+              <a:t>18/4/2019</a:t>
             </a:fld>
             <a:endParaRPr lang="en-SG"/>
           </a:p>
@@ -595,7 +595,7 @@
           <a:p>
             <a:fld id="{F6D0DC95-96D7-4443-A9FE-D9D3645C5F4E}" type="datetimeFigureOut">
               <a:rPr lang="en-SG" smtClean="0"/>
-              <a:t>12/4/2019</a:t>
+              <a:t>18/4/2019</a:t>
             </a:fld>
             <a:endParaRPr lang="en-SG"/>
           </a:p>
@@ -765,7 +765,7 @@
           <a:p>
             <a:fld id="{F6D0DC95-96D7-4443-A9FE-D9D3645C5F4E}" type="datetimeFigureOut">
               <a:rPr lang="en-SG" smtClean="0"/>
-              <a:t>12/4/2019</a:t>
+              <a:t>18/4/2019</a:t>
             </a:fld>
             <a:endParaRPr lang="en-SG"/>
           </a:p>
@@ -1009,7 +1009,7 @@
           <a:p>
             <a:fld id="{F6D0DC95-96D7-4443-A9FE-D9D3645C5F4E}" type="datetimeFigureOut">
               <a:rPr lang="en-SG" smtClean="0"/>
-              <a:t>12/4/2019</a:t>
+              <a:t>18/4/2019</a:t>
             </a:fld>
             <a:endParaRPr lang="en-SG"/>
           </a:p>
@@ -1241,7 +1241,7 @@
           <a:p>
             <a:fld id="{F6D0DC95-96D7-4443-A9FE-D9D3645C5F4E}" type="datetimeFigureOut">
               <a:rPr lang="en-SG" smtClean="0"/>
-              <a:t>12/4/2019</a:t>
+              <a:t>18/4/2019</a:t>
             </a:fld>
             <a:endParaRPr lang="en-SG"/>
           </a:p>
@@ -1608,7 +1608,7 @@
           <a:p>
             <a:fld id="{F6D0DC95-96D7-4443-A9FE-D9D3645C5F4E}" type="datetimeFigureOut">
               <a:rPr lang="en-SG" smtClean="0"/>
-              <a:t>12/4/2019</a:t>
+              <a:t>18/4/2019</a:t>
             </a:fld>
             <a:endParaRPr lang="en-SG"/>
           </a:p>
@@ -1726,7 +1726,7 @@
           <a:p>
             <a:fld id="{F6D0DC95-96D7-4443-A9FE-D9D3645C5F4E}" type="datetimeFigureOut">
               <a:rPr lang="en-SG" smtClean="0"/>
-              <a:t>12/4/2019</a:t>
+              <a:t>18/4/2019</a:t>
             </a:fld>
             <a:endParaRPr lang="en-SG"/>
           </a:p>
@@ -1821,7 +1821,7 @@
           <a:p>
             <a:fld id="{F6D0DC95-96D7-4443-A9FE-D9D3645C5F4E}" type="datetimeFigureOut">
               <a:rPr lang="en-SG" smtClean="0"/>
-              <a:t>12/4/2019</a:t>
+              <a:t>18/4/2019</a:t>
             </a:fld>
             <a:endParaRPr lang="en-SG"/>
           </a:p>
@@ -2098,7 +2098,7 @@
           <a:p>
             <a:fld id="{F6D0DC95-96D7-4443-A9FE-D9D3645C5F4E}" type="datetimeFigureOut">
               <a:rPr lang="en-SG" smtClean="0"/>
-              <a:t>12/4/2019</a:t>
+              <a:t>18/4/2019</a:t>
             </a:fld>
             <a:endParaRPr lang="en-SG"/>
           </a:p>
@@ -2355,7 +2355,7 @@
           <a:p>
             <a:fld id="{F6D0DC95-96D7-4443-A9FE-D9D3645C5F4E}" type="datetimeFigureOut">
               <a:rPr lang="en-SG" smtClean="0"/>
-              <a:t>12/4/2019</a:t>
+              <a:t>18/4/2019</a:t>
             </a:fld>
             <a:endParaRPr lang="en-SG"/>
           </a:p>
@@ -2568,7 +2568,7 @@
           <a:p>
             <a:fld id="{F6D0DC95-96D7-4443-A9FE-D9D3645C5F4E}" type="datetimeFigureOut">
               <a:rPr lang="en-SG" smtClean="0"/>
-              <a:t>12/4/2019</a:t>
+              <a:t>18/4/2019</a:t>
             </a:fld>
             <a:endParaRPr lang="en-SG"/>
           </a:p>
@@ -3075,8 +3075,8 @@
             </a:p>
           </p:txBody>
         </p:sp>
-        <mc:AlternateContent xmlns:mc="http://schemas.openxmlformats.org/markup-compatibility/2006">
-          <mc:Choice xmlns:a14="http://schemas.microsoft.com/office/drawing/2010/main" Requires="a14">
+        <mc:AlternateContent xmlns:mc="http://schemas.openxmlformats.org/markup-compatibility/2006" xmlns:a14="http://schemas.microsoft.com/office/drawing/2010/main">
+          <mc:Choice Requires="a14">
             <p:sp>
               <p:nvSpPr>
                 <p:cNvPr id="8" name="TextBox 7">
@@ -3275,7 +3275,7 @@
               </p:txBody>
             </p:sp>
           </mc:Choice>
-          <mc:Fallback>
+          <mc:Fallback xmlns="">
             <p:sp>
               <p:nvSpPr>
                 <p:cNvPr id="8" name="TextBox 7">
@@ -3533,8 +3533,8 @@
             </a:fontRef>
           </p:style>
         </p:cxnSp>
-        <mc:AlternateContent xmlns:mc="http://schemas.openxmlformats.org/markup-compatibility/2006">
-          <mc:Choice xmlns:a14="http://schemas.microsoft.com/office/drawing/2010/main" Requires="a14">
+        <mc:AlternateContent xmlns:mc="http://schemas.openxmlformats.org/markup-compatibility/2006" xmlns:a14="http://schemas.microsoft.com/office/drawing/2010/main">
+          <mc:Choice Requires="a14">
             <p:sp>
               <p:nvSpPr>
                 <p:cNvPr id="25" name="TextBox 24">
@@ -3629,7 +3629,7 @@
               </p:txBody>
             </p:sp>
           </mc:Choice>
-          <mc:Fallback>
+          <mc:Fallback xmlns="">
             <p:sp>
               <p:nvSpPr>
                 <p:cNvPr id="25" name="TextBox 24">
@@ -3832,8 +3832,8 @@
             </a:p>
           </p:txBody>
         </p:sp>
-        <mc:AlternateContent xmlns:mc="http://schemas.openxmlformats.org/markup-compatibility/2006">
-          <mc:Choice xmlns:a14="http://schemas.microsoft.com/office/drawing/2010/main" Requires="a14">
+        <mc:AlternateContent xmlns:mc="http://schemas.openxmlformats.org/markup-compatibility/2006" xmlns:a14="http://schemas.microsoft.com/office/drawing/2010/main">
+          <mc:Choice Requires="a14">
             <p:sp>
               <p:nvSpPr>
                 <p:cNvPr id="30" name="TextBox 29">
@@ -4208,7 +4208,7 @@
               </p:txBody>
             </p:sp>
           </mc:Choice>
-          <mc:Fallback>
+          <mc:Fallback xmlns="">
             <p:sp>
               <p:nvSpPr>
                 <p:cNvPr id="30" name="TextBox 29">
@@ -4667,8 +4667,8 @@
             </a:p>
           </p:txBody>
         </p:sp>
-        <mc:AlternateContent xmlns:mc="http://schemas.openxmlformats.org/markup-compatibility/2006">
-          <mc:Choice xmlns:a14="http://schemas.microsoft.com/office/drawing/2010/main" Requires="a14">
+        <mc:AlternateContent xmlns:mc="http://schemas.openxmlformats.org/markup-compatibility/2006" xmlns:a14="http://schemas.microsoft.com/office/drawing/2010/main">
+          <mc:Choice Requires="a14">
             <p:sp>
               <p:nvSpPr>
                 <p:cNvPr id="8" name="TextBox 7">
@@ -4867,7 +4867,7 @@
               </p:txBody>
             </p:sp>
           </mc:Choice>
-          <mc:Fallback>
+          <mc:Fallback xmlns="">
             <p:sp>
               <p:nvSpPr>
                 <p:cNvPr id="8" name="TextBox 7">
@@ -5125,8 +5125,8 @@
             </a:fontRef>
           </p:style>
         </p:cxnSp>
-        <mc:AlternateContent xmlns:mc="http://schemas.openxmlformats.org/markup-compatibility/2006">
-          <mc:Choice xmlns:a14="http://schemas.microsoft.com/office/drawing/2010/main" Requires="a14">
+        <mc:AlternateContent xmlns:mc="http://schemas.openxmlformats.org/markup-compatibility/2006" xmlns:a14="http://schemas.microsoft.com/office/drawing/2010/main">
+          <mc:Choice Requires="a14">
             <p:sp>
               <p:nvSpPr>
                 <p:cNvPr id="25" name="TextBox 24">
@@ -5221,7 +5221,7 @@
               </p:txBody>
             </p:sp>
           </mc:Choice>
-          <mc:Fallback>
+          <mc:Fallback xmlns="">
             <p:sp>
               <p:nvSpPr>
                 <p:cNvPr id="25" name="TextBox 24">
@@ -5424,8 +5424,8 @@
             </a:p>
           </p:txBody>
         </p:sp>
-        <mc:AlternateContent xmlns:mc="http://schemas.openxmlformats.org/markup-compatibility/2006">
-          <mc:Choice xmlns:a14="http://schemas.microsoft.com/office/drawing/2010/main" Requires="a14">
+        <mc:AlternateContent xmlns:mc="http://schemas.openxmlformats.org/markup-compatibility/2006" xmlns:a14="http://schemas.microsoft.com/office/drawing/2010/main">
+          <mc:Choice Requires="a14">
             <p:sp>
               <p:nvSpPr>
                 <p:cNvPr id="30" name="TextBox 29">
@@ -5800,7 +5800,7 @@
               </p:txBody>
             </p:sp>
           </mc:Choice>
-          <mc:Fallback>
+          <mc:Fallback xmlns="">
             <p:sp>
               <p:nvSpPr>
                 <p:cNvPr id="30" name="TextBox 29">
@@ -6128,8 +6128,8 @@
             </a:fontRef>
           </p:style>
         </p:cxnSp>
-        <mc:AlternateContent xmlns:mc="http://schemas.openxmlformats.org/markup-compatibility/2006">
-          <mc:Choice xmlns:a14="http://schemas.microsoft.com/office/drawing/2010/main" Requires="a14">
+        <mc:AlternateContent xmlns:mc="http://schemas.openxmlformats.org/markup-compatibility/2006" xmlns:a14="http://schemas.microsoft.com/office/drawing/2010/main">
+          <mc:Choice Requires="a14">
             <p:sp>
               <p:nvSpPr>
                 <p:cNvPr id="39" name="TextBox 38">
@@ -6272,7 +6272,7 @@
               </p:txBody>
             </p:sp>
           </mc:Choice>
-          <mc:Fallback>
+          <mc:Fallback xmlns="">
             <p:sp>
               <p:nvSpPr>
                 <p:cNvPr id="39" name="TextBox 38">
@@ -6357,8 +6357,8 @@
             </a:fontRef>
           </p:style>
         </p:cxnSp>
-        <mc:AlternateContent xmlns:mc="http://schemas.openxmlformats.org/markup-compatibility/2006">
-          <mc:Choice xmlns:a14="http://schemas.microsoft.com/office/drawing/2010/main" Requires="a14">
+        <mc:AlternateContent xmlns:mc="http://schemas.openxmlformats.org/markup-compatibility/2006" xmlns:a14="http://schemas.microsoft.com/office/drawing/2010/main">
+          <mc:Choice Requires="a14">
             <p:sp>
               <p:nvSpPr>
                 <p:cNvPr id="41" name="TextBox 40">
@@ -6439,7 +6439,7 @@
               </p:txBody>
             </p:sp>
           </mc:Choice>
-          <mc:Fallback>
+          <mc:Fallback xmlns="">
             <p:sp>
               <p:nvSpPr>
                 <p:cNvPr id="41" name="TextBox 40">
@@ -6524,8 +6524,8 @@
             </a:fontRef>
           </p:style>
         </p:cxnSp>
-        <mc:AlternateContent xmlns:mc="http://schemas.openxmlformats.org/markup-compatibility/2006">
-          <mc:Choice xmlns:a14="http://schemas.microsoft.com/office/drawing/2010/main" Requires="a14">
+        <mc:AlternateContent xmlns:mc="http://schemas.openxmlformats.org/markup-compatibility/2006" xmlns:a14="http://schemas.microsoft.com/office/drawing/2010/main">
+          <mc:Choice Requires="a14">
             <p:sp>
               <p:nvSpPr>
                 <p:cNvPr id="43" name="TextBox 42">
@@ -6606,7 +6606,7 @@
               </p:txBody>
             </p:sp>
           </mc:Choice>
-          <mc:Fallback>
+          <mc:Fallback xmlns="">
             <p:sp>
               <p:nvSpPr>
                 <p:cNvPr id="43" name="TextBox 42">
@@ -6785,8 +6785,8 @@
             </a:p>
           </p:txBody>
         </p:sp>
-        <mc:AlternateContent xmlns:mc="http://schemas.openxmlformats.org/markup-compatibility/2006">
-          <mc:Choice xmlns:a14="http://schemas.microsoft.com/office/drawing/2010/main" Requires="a14">
+        <mc:AlternateContent xmlns:mc="http://schemas.openxmlformats.org/markup-compatibility/2006" xmlns:a14="http://schemas.microsoft.com/office/drawing/2010/main">
+          <mc:Choice Requires="a14">
             <p:sp>
               <p:nvSpPr>
                 <p:cNvPr id="47" name="TextBox 46">
@@ -6879,7 +6879,7 @@
               </p:txBody>
             </p:sp>
           </mc:Choice>
-          <mc:Fallback>
+          <mc:Fallback xmlns="">
             <p:sp>
               <p:nvSpPr>
                 <p:cNvPr id="47" name="TextBox 46">
@@ -7026,21 +7026,7 @@
                       <a:latin typeface="Times New Roman" panose="02020603050405020304" pitchFamily="18" charset="0"/>
                       <a:cs typeface="Times New Roman" panose="02020603050405020304" pitchFamily="18" charset="0"/>
                     </a:rPr>
-                    <a:t>- - Decrypt </a:t>
-                  </a:r>
-                  <a:r>
-                    <a:rPr lang="en-SG" sz="1400">
-                      <a:latin typeface="Times New Roman" panose="02020603050405020304" pitchFamily="18" charset="0"/>
-                      <a:cs typeface="Times New Roman" panose="02020603050405020304" pitchFamily="18" charset="0"/>
-                    </a:rPr>
-                    <a:t>file size  </a:t>
-                  </a:r>
-                  <a:r>
-                    <a:rPr lang="en-SG" sz="1400" dirty="0">
-                      <a:latin typeface="Times New Roman" panose="02020603050405020304" pitchFamily="18" charset="0"/>
-                      <a:cs typeface="Times New Roman" panose="02020603050405020304" pitchFamily="18" charset="0"/>
-                    </a:rPr>
-                    <a:t>(</a:t>
+                    <a:t>- Decrypt file size  (</a:t>
                   </a:r>
                   <a14:m>
                     <m:oMath xmlns:m="http://schemas.openxmlformats.org/officeDocument/2006/math">
@@ -7182,8 +7168,8 @@
             </a:p>
           </p:txBody>
         </p:sp>
-        <mc:AlternateContent xmlns:mc="http://schemas.openxmlformats.org/markup-compatibility/2006">
-          <mc:Choice xmlns:a14="http://schemas.microsoft.com/office/drawing/2010/main" Requires="a14">
+        <mc:AlternateContent xmlns:mc="http://schemas.openxmlformats.org/markup-compatibility/2006" xmlns:a14="http://schemas.microsoft.com/office/drawing/2010/main">
+          <mc:Choice Requires="a14">
             <p:sp>
               <p:nvSpPr>
                 <p:cNvPr id="49" name="TextBox 48">
@@ -7276,7 +7262,7 @@
               </p:txBody>
             </p:sp>
           </mc:Choice>
-          <mc:Fallback>
+          <mc:Fallback xmlns="">
             <p:sp>
               <p:nvSpPr>
                 <p:cNvPr id="49" name="TextBox 48">
@@ -7502,8 +7488,8 @@
             </a:p>
           </p:txBody>
         </p:sp>
-        <mc:AlternateContent xmlns:mc="http://schemas.openxmlformats.org/markup-compatibility/2006">
-          <mc:Choice xmlns:a14="http://schemas.microsoft.com/office/drawing/2010/main" Requires="a14">
+        <mc:AlternateContent xmlns:mc="http://schemas.openxmlformats.org/markup-compatibility/2006" xmlns:a14="http://schemas.microsoft.com/office/drawing/2010/main">
+          <mc:Choice Requires="a14">
             <p:sp>
               <p:nvSpPr>
                 <p:cNvPr id="8" name="TextBox 7">
@@ -7702,7 +7688,7 @@
               </p:txBody>
             </p:sp>
           </mc:Choice>
-          <mc:Fallback>
+          <mc:Fallback xmlns="">
             <p:sp>
               <p:nvSpPr>
                 <p:cNvPr id="8" name="TextBox 7">
@@ -7960,8 +7946,8 @@
             </a:fontRef>
           </p:style>
         </p:cxnSp>
-        <mc:AlternateContent xmlns:mc="http://schemas.openxmlformats.org/markup-compatibility/2006">
-          <mc:Choice xmlns:a14="http://schemas.microsoft.com/office/drawing/2010/main" Requires="a14">
+        <mc:AlternateContent xmlns:mc="http://schemas.openxmlformats.org/markup-compatibility/2006" xmlns:a14="http://schemas.microsoft.com/office/drawing/2010/main">
+          <mc:Choice Requires="a14">
             <p:sp>
               <p:nvSpPr>
                 <p:cNvPr id="25" name="TextBox 24">
@@ -8056,7 +8042,7 @@
               </p:txBody>
             </p:sp>
           </mc:Choice>
-          <mc:Fallback>
+          <mc:Fallback xmlns="">
             <p:sp>
               <p:nvSpPr>
                 <p:cNvPr id="25" name="TextBox 24">
@@ -8259,8 +8245,8 @@
             </a:p>
           </p:txBody>
         </p:sp>
-        <mc:AlternateContent xmlns:mc="http://schemas.openxmlformats.org/markup-compatibility/2006">
-          <mc:Choice xmlns:a14="http://schemas.microsoft.com/office/drawing/2010/main" Requires="a14">
+        <mc:AlternateContent xmlns:mc="http://schemas.openxmlformats.org/markup-compatibility/2006" xmlns:a14="http://schemas.microsoft.com/office/drawing/2010/main">
+          <mc:Choice Requires="a14">
             <p:sp>
               <p:nvSpPr>
                 <p:cNvPr id="30" name="TextBox 29">
@@ -8635,7 +8621,7 @@
               </p:txBody>
             </p:sp>
           </mc:Choice>
-          <mc:Fallback>
+          <mc:Fallback xmlns="">
             <p:sp>
               <p:nvSpPr>
                 <p:cNvPr id="30" name="TextBox 29">
@@ -8885,8 +8871,8 @@
             </a:fontRef>
           </p:style>
         </p:cxnSp>
-        <mc:AlternateContent xmlns:mc="http://schemas.openxmlformats.org/markup-compatibility/2006">
-          <mc:Choice xmlns:a14="http://schemas.microsoft.com/office/drawing/2010/main" Requires="a14">
+        <mc:AlternateContent xmlns:mc="http://schemas.openxmlformats.org/markup-compatibility/2006" xmlns:a14="http://schemas.microsoft.com/office/drawing/2010/main">
+          <mc:Choice Requires="a14">
             <p:sp>
               <p:nvSpPr>
                 <p:cNvPr id="38" name="TextBox 37">
@@ -8967,7 +8953,7 @@
               </p:txBody>
             </p:sp>
           </mc:Choice>
-          <mc:Fallback>
+          <mc:Fallback xmlns="">
             <p:sp>
               <p:nvSpPr>
                 <p:cNvPr id="38" name="TextBox 37">
@@ -9052,8 +9038,8 @@
             </a:fontRef>
           </p:style>
         </p:cxnSp>
-        <mc:AlternateContent xmlns:mc="http://schemas.openxmlformats.org/markup-compatibility/2006">
-          <mc:Choice xmlns:a14="http://schemas.microsoft.com/office/drawing/2010/main" Requires="a14">
+        <mc:AlternateContent xmlns:mc="http://schemas.openxmlformats.org/markup-compatibility/2006" xmlns:a14="http://schemas.microsoft.com/office/drawing/2010/main">
+          <mc:Choice Requires="a14">
             <p:sp>
               <p:nvSpPr>
                 <p:cNvPr id="39" name="TextBox 38">
@@ -9164,7 +9150,7 @@
               </p:txBody>
             </p:sp>
           </mc:Choice>
-          <mc:Fallback>
+          <mc:Fallback xmlns="">
             <p:sp>
               <p:nvSpPr>
                 <p:cNvPr id="39" name="TextBox 38">
@@ -9249,8 +9235,8 @@
             </a:fontRef>
           </p:style>
         </p:cxnSp>
-        <mc:AlternateContent xmlns:mc="http://schemas.openxmlformats.org/markup-compatibility/2006">
-          <mc:Choice xmlns:a14="http://schemas.microsoft.com/office/drawing/2010/main" Requires="a14">
+        <mc:AlternateContent xmlns:mc="http://schemas.openxmlformats.org/markup-compatibility/2006" xmlns:a14="http://schemas.microsoft.com/office/drawing/2010/main">
+          <mc:Choice Requires="a14">
             <p:sp>
               <p:nvSpPr>
                 <p:cNvPr id="41" name="TextBox 40">
@@ -9322,7 +9308,7 @@
               </p:txBody>
             </p:sp>
           </mc:Choice>
-          <mc:Fallback>
+          <mc:Fallback xmlns="">
             <p:sp>
               <p:nvSpPr>
                 <p:cNvPr id="41" name="TextBox 40">
@@ -9524,7 +9510,7 @@
                       <a:latin typeface="Times New Roman" panose="02020603050405020304" pitchFamily="18" charset="0"/>
                       <a:cs typeface="Times New Roman" panose="02020603050405020304" pitchFamily="18" charset="0"/>
                     </a:rPr>
-                    <a:t>(file block))</a:t>
+                    <a:t>(file))</a:t>
                   </a:r>
                 </a:p>
               </p:txBody>
@@ -9580,8 +9566,8 @@
             </p:sp>
           </mc:Fallback>
         </mc:AlternateContent>
-        <mc:AlternateContent xmlns:mc="http://schemas.openxmlformats.org/markup-compatibility/2006">
-          <mc:Choice xmlns:a14="http://schemas.microsoft.com/office/drawing/2010/main" Requires="a14">
+        <mc:AlternateContent xmlns:mc="http://schemas.openxmlformats.org/markup-compatibility/2006" xmlns:a14="http://schemas.microsoft.com/office/drawing/2010/main">
+          <mc:Choice Requires="a14">
             <p:sp>
               <p:nvSpPr>
                 <p:cNvPr id="48" name="TextBox 47">
@@ -9713,7 +9699,7 @@
               </p:txBody>
             </p:sp>
           </mc:Choice>
-          <mc:Fallback>
+          <mc:Fallback xmlns="">
             <p:sp>
               <p:nvSpPr>
                 <p:cNvPr id="48" name="TextBox 47">
@@ -9801,8 +9787,8 @@
             </a:p>
           </p:txBody>
         </p:sp>
-        <mc:AlternateContent xmlns:mc="http://schemas.openxmlformats.org/markup-compatibility/2006">
-          <mc:Choice xmlns:a14="http://schemas.microsoft.com/office/drawing/2010/main" Requires="a14">
+        <mc:AlternateContent xmlns:mc="http://schemas.openxmlformats.org/markup-compatibility/2006" xmlns:a14="http://schemas.microsoft.com/office/drawing/2010/main">
+          <mc:Choice Requires="a14">
             <p:sp>
               <p:nvSpPr>
                 <p:cNvPr id="51" name="TextBox 50">
@@ -10008,7 +9994,7 @@
               </p:txBody>
             </p:sp>
           </mc:Choice>
-          <mc:Fallback>
+          <mc:Fallback xmlns="">
             <p:sp>
               <p:nvSpPr>
                 <p:cNvPr id="51" name="TextBox 50">
@@ -10058,8 +10044,8 @@
             </p:sp>
           </mc:Fallback>
         </mc:AlternateContent>
-        <mc:AlternateContent xmlns:mc="http://schemas.openxmlformats.org/markup-compatibility/2006">
-          <mc:Choice xmlns:a14="http://schemas.microsoft.com/office/drawing/2010/main" Requires="a14">
+        <mc:AlternateContent xmlns:mc="http://schemas.openxmlformats.org/markup-compatibility/2006" xmlns:a14="http://schemas.microsoft.com/office/drawing/2010/main">
+          <mc:Choice Requires="a14">
             <p:sp>
               <p:nvSpPr>
                 <p:cNvPr id="52" name="TextBox 51">
@@ -10143,7 +10129,7 @@
               </p:txBody>
             </p:sp>
           </mc:Choice>
-          <mc:Fallback>
+          <mc:Fallback xmlns="">
             <p:sp>
               <p:nvSpPr>
                 <p:cNvPr id="52" name="TextBox 51">

</xml_diff>